<commit_message>
add pictures last three slides
</commit_message>
<xml_diff>
--- a/OST_2024-25_Predlozak za prakticni seminarski rad_Web (1).pptx
+++ b/OST_2024-25_Predlozak za prakticni seminarski rad_Web (1).pptx
@@ -32,9 +32,9 @@
     <p:sldId id="4277" r:id="rId23"/>
     <p:sldId id="4276" r:id="rId24"/>
     <p:sldId id="4618" r:id="rId25"/>
-    <p:sldId id="4606" r:id="rId26"/>
-    <p:sldId id="4607" r:id="rId27"/>
-    <p:sldId id="4609" r:id="rId28"/>
+    <p:sldId id="4609" r:id="rId26"/>
+    <p:sldId id="4622" r:id="rId27"/>
+    <p:sldId id="4623" r:id="rId28"/>
     <p:sldId id="4617" r:id="rId29"/>
   </p:sldIdLst>
   <p:sldSz cx="14630400" cy="8229600"/>
@@ -189,9 +189,9 @@
             <p14:sldId id="4277"/>
             <p14:sldId id="4276"/>
             <p14:sldId id="4618"/>
-            <p14:sldId id="4606"/>
-            <p14:sldId id="4607"/>
             <p14:sldId id="4609"/>
+            <p14:sldId id="4622"/>
+            <p14:sldId id="4623"/>
             <p14:sldId id="4617"/>
           </p14:sldIdLst>
         </p14:section>
@@ -237,7 +237,7 @@
 
 <file path=ppt/commentAuthors.xml><?xml version="1.0" encoding="utf-8"?>
 <p:cmAuthorLst xmlns:a="http://schemas.openxmlformats.org/drawingml/2006/main" xmlns:r="http://schemas.openxmlformats.org/officeDocument/2006/relationships" xmlns:p="http://schemas.openxmlformats.org/presentationml/2006/main">
-  <p:cmAuthor id="48" name="Author" initials="A" lastIdx="0" clrIdx="45"/>
+  <p:cmAuthor id="49" name="Autor" initials="A" lastIdx="0" clrIdx="46"/>
 </p:cmAuthorLst>
 </file>
 
@@ -18556,6 +18556,7 @@
             </a:extLst>
           </p:cNvPr>
           <p:cNvCxnSpPr>
+            <a:cxnSpLocks/>
             <a:stCxn id="6" idx="2"/>
             <a:endCxn id="9" idx="0"/>
           </p:cNvCxnSpPr>
@@ -19571,484 +19572,6 @@
         <p:cNvPr id="1" name="">
           <a:extLst>
             <a:ext uri="{FF2B5EF4-FFF2-40B4-BE49-F238E27FC236}">
-              <a16:creationId xmlns:a16="http://schemas.microsoft.com/office/drawing/2014/main" id="{F753023C-CBA8-9963-E49B-5E1FBEAB7E13}"/>
-            </a:ext>
-          </a:extLst>
-        </p:cNvPr>
-        <p:cNvGrpSpPr/>
-        <p:nvPr/>
-      </p:nvGrpSpPr>
-      <p:grpSpPr>
-        <a:xfrm>
-          <a:off x="0" y="0"/>
-          <a:ext cx="0" cy="0"/>
-          <a:chOff x="0" y="0"/>
-          <a:chExt cx="0" cy="0"/>
-        </a:xfrm>
-      </p:grpSpPr>
-      <p:sp>
-        <p:nvSpPr>
-          <p:cNvPr id="2" name="Title 1">
-            <a:extLst>
-              <a:ext uri="{FF2B5EF4-FFF2-40B4-BE49-F238E27FC236}">
-                <a16:creationId xmlns:a16="http://schemas.microsoft.com/office/drawing/2014/main" id="{82A19E9F-0A03-FD36-912B-EC20B2093BE2}"/>
-              </a:ext>
-            </a:extLst>
-          </p:cNvPr>
-          <p:cNvSpPr>
-            <a:spLocks noGrp="1"/>
-          </p:cNvSpPr>
-          <p:nvPr>
-            <p:ph type="title"/>
-          </p:nvPr>
-        </p:nvSpPr>
-        <p:spPr>
-          <a:xfrm>
-            <a:off x="0" y="458576"/>
-            <a:ext cx="14630400" cy="892552"/>
-          </a:xfrm>
-        </p:spPr>
-        <p:txBody>
-          <a:bodyPr/>
-          <a:lstStyle/>
-          <a:p>
-            <a:r>
-              <a:rPr lang="en-GB" sz="2600" dirty="0" err="1"/>
-              <a:t>Razvoj</a:t>
-            </a:r>
-            <a:r>
-              <a:rPr lang="en-GB" sz="2600" dirty="0"/>
-              <a:t> </a:t>
-            </a:r>
-            <a:r>
-              <a:rPr lang="hr-HR" sz="2600" dirty="0"/>
-              <a:t>neuronske mreže</a:t>
-            </a:r>
-            <a:r>
-              <a:rPr lang="en-GB" sz="2600" dirty="0"/>
-              <a:t> za </a:t>
-            </a:r>
-            <a:r>
-              <a:rPr lang="en-GB" sz="2600" dirty="0" err="1"/>
-              <a:t>estimaciju</a:t>
-            </a:r>
-            <a:r>
-              <a:rPr lang="en-GB" sz="2600" dirty="0"/>
-              <a:t>/</a:t>
-            </a:r>
-            <a:r>
-              <a:rPr lang="en-GB" sz="2600" dirty="0" err="1"/>
-              <a:t>predikciju</a:t>
-            </a:r>
-            <a:r>
-              <a:rPr lang="en-GB" sz="2600" dirty="0"/>
-              <a:t> </a:t>
-            </a:r>
-            <a:r>
-              <a:rPr lang="en-GB" sz="2600" dirty="0" err="1"/>
-              <a:t>performansi</a:t>
-            </a:r>
-            <a:r>
-              <a:rPr lang="en-GB" sz="2600" dirty="0"/>
-              <a:t> </a:t>
-            </a:r>
-            <a:r>
-              <a:rPr lang="en-GB" sz="2600" dirty="0" err="1"/>
-              <a:t>na</a:t>
-            </a:r>
-            <a:r>
-              <a:rPr lang="en-GB" sz="2600" dirty="0"/>
-              <a:t> </a:t>
-            </a:r>
-            <a:r>
-              <a:rPr lang="en-GB" sz="2600" dirty="0" err="1"/>
-              <a:t>simulatoru</a:t>
-            </a:r>
-            <a:r>
-              <a:rPr lang="en-GB" sz="2600" dirty="0"/>
-              <a:t> </a:t>
-            </a:r>
-            <a:r>
-              <a:rPr lang="en-GB" sz="2600" dirty="0" err="1"/>
-              <a:t>leta</a:t>
-            </a:r>
-            <a:r>
-              <a:rPr lang="en-GB" sz="2600" dirty="0"/>
-              <a:t> u startle </a:t>
-            </a:r>
-            <a:r>
-              <a:rPr lang="en-GB" sz="2600" dirty="0" err="1"/>
-              <a:t>uvjetima</a:t>
-            </a:r>
-            <a:r>
-              <a:rPr lang="en-GB" sz="2600" dirty="0"/>
-              <a:t> </a:t>
-            </a:r>
-            <a:r>
-              <a:rPr lang="en-GB" sz="2600" dirty="0" err="1"/>
-              <a:t>na</a:t>
-            </a:r>
-            <a:r>
-              <a:rPr lang="en-GB" sz="2600" dirty="0"/>
-              <a:t> </a:t>
-            </a:r>
-            <a:r>
-              <a:rPr lang="en-GB" sz="2600" dirty="0" err="1"/>
-              <a:t>temelju</a:t>
-            </a:r>
-            <a:r>
-              <a:rPr lang="en-GB" sz="2600" dirty="0"/>
-              <a:t> </a:t>
-            </a:r>
-            <a:r>
-              <a:rPr lang="en-GB" sz="2600" dirty="0" err="1"/>
-              <a:t>signala</a:t>
-            </a:r>
-            <a:r>
-              <a:rPr lang="en-GB" sz="2600" dirty="0"/>
-              <a:t> </a:t>
-            </a:r>
-            <a:r>
-              <a:rPr lang="en-GB" sz="2600" dirty="0" err="1"/>
-              <a:t>vodljivosti</a:t>
-            </a:r>
-            <a:r>
-              <a:rPr lang="en-GB" sz="2600" dirty="0"/>
-              <a:t> </a:t>
-            </a:r>
-            <a:r>
-              <a:rPr lang="en-GB" sz="2600" dirty="0" err="1"/>
-              <a:t>kože</a:t>
-            </a:r>
-            <a:r>
-              <a:rPr lang="hr-HR" sz="2600" dirty="0"/>
-              <a:t> </a:t>
-            </a:r>
-            <a:r>
-              <a:rPr lang="en-GB" sz="2600" dirty="0" err="1"/>
-              <a:t>i</a:t>
-            </a:r>
-            <a:r>
-              <a:rPr lang="en-GB" sz="2600" dirty="0"/>
-              <a:t> </a:t>
-            </a:r>
-            <a:r>
-              <a:rPr lang="en-GB" sz="2600" dirty="0" err="1"/>
-              <a:t>disanja</a:t>
-            </a:r>
-            <a:endParaRPr lang="en-GB" sz="2600" dirty="0"/>
-          </a:p>
-        </p:txBody>
-      </p:sp>
-      <p:sp>
-        <p:nvSpPr>
-          <p:cNvPr id="4" name="Slide Number Placeholder 3">
-            <a:extLst>
-              <a:ext uri="{FF2B5EF4-FFF2-40B4-BE49-F238E27FC236}">
-                <a16:creationId xmlns:a16="http://schemas.microsoft.com/office/drawing/2014/main" id="{0B83446B-BDD8-78A6-CE01-2A0FF6FB409E}"/>
-              </a:ext>
-            </a:extLst>
-          </p:cNvPr>
-          <p:cNvSpPr>
-            <a:spLocks noGrp="1"/>
-          </p:cNvSpPr>
-          <p:nvPr>
-            <p:ph type="sldNum" sz="quarter" idx="10"/>
-          </p:nvPr>
-        </p:nvSpPr>
-        <p:spPr/>
-        <p:txBody>
-          <a:bodyPr/>
-          <a:lstStyle/>
-          <a:p>
-            <a:fld id="{C92FC937-38D6-4B8F-AEB3-E5F6C110AD7F}" type="slidenum">
-              <a:rPr lang="hr-HR" smtClean="0"/>
-              <a:t>21</a:t>
-            </a:fld>
-            <a:endParaRPr lang="hr-HR"/>
-          </a:p>
-        </p:txBody>
-      </p:sp>
-      <p:sp>
-        <p:nvSpPr>
-          <p:cNvPr id="8" name="Content Placeholder 7">
-            <a:extLst>
-              <a:ext uri="{FF2B5EF4-FFF2-40B4-BE49-F238E27FC236}">
-                <a16:creationId xmlns:a16="http://schemas.microsoft.com/office/drawing/2014/main" id="{0DA9D08B-754D-3A0D-9391-BF55536839E0}"/>
-              </a:ext>
-            </a:extLst>
-          </p:cNvPr>
-          <p:cNvSpPr>
-            <a:spLocks noGrp="1"/>
-          </p:cNvSpPr>
-          <p:nvPr>
-            <p:ph idx="1"/>
-          </p:nvPr>
-        </p:nvSpPr>
-        <p:spPr>
-          <a:xfrm>
-            <a:off x="316536" y="1694642"/>
-            <a:ext cx="13980855" cy="394595"/>
-          </a:xfrm>
-        </p:spPr>
-        <p:txBody>
-          <a:bodyPr/>
-          <a:lstStyle/>
-          <a:p>
-            <a:pPr marL="0" indent="0">
-              <a:buNone/>
-            </a:pPr>
-            <a:r>
-              <a:rPr lang="hr-HR" b="1" dirty="0"/>
-              <a:t>Rezultati</a:t>
-            </a:r>
-            <a:endParaRPr lang="hr-HR" b="1" u="sng" dirty="0"/>
-          </a:p>
-        </p:txBody>
-      </p:sp>
-      <p:pic>
-        <p:nvPicPr>
-          <p:cNvPr id="5" name="Picture 4">
-            <a:extLst>
-              <a:ext uri="{FF2B5EF4-FFF2-40B4-BE49-F238E27FC236}">
-                <a16:creationId xmlns:a16="http://schemas.microsoft.com/office/drawing/2014/main" id="{367420ED-AE8A-3B7C-9BB9-02321CE4A31E}"/>
-              </a:ext>
-            </a:extLst>
-          </p:cNvPr>
-          <p:cNvPicPr>
-            <a:picLocks noChangeAspect="1"/>
-          </p:cNvPicPr>
-          <p:nvPr/>
-        </p:nvPicPr>
-        <p:blipFill>
-          <a:blip r:embed="rId2">
-            <a:extLst>
-              <a:ext uri="{28A0092B-C50C-407E-A947-70E740481C1C}">
-                <a14:useLocalDpi xmlns:a14="http://schemas.microsoft.com/office/drawing/2010/main" val="0"/>
-              </a:ext>
-            </a:extLst>
-          </a:blip>
-          <a:srcRect/>
-          <a:stretch/>
-        </p:blipFill>
-        <p:spPr>
-          <a:xfrm>
-            <a:off x="289839" y="2089238"/>
-            <a:ext cx="7483088" cy="5962134"/>
-          </a:xfrm>
-          <a:prstGeom prst="rect">
-            <a:avLst/>
-          </a:prstGeom>
-        </p:spPr>
-      </p:pic>
-      <p:sp>
-        <p:nvSpPr>
-          <p:cNvPr id="6" name="Rectangle 5">
-            <a:extLst>
-              <a:ext uri="{FF2B5EF4-FFF2-40B4-BE49-F238E27FC236}">
-                <a16:creationId xmlns:a16="http://schemas.microsoft.com/office/drawing/2014/main" id="{F884D628-67C7-B033-EE68-4E9B8B88FB68}"/>
-              </a:ext>
-            </a:extLst>
-          </p:cNvPr>
-          <p:cNvSpPr/>
-          <p:nvPr/>
-        </p:nvSpPr>
-        <p:spPr>
-          <a:xfrm>
-            <a:off x="8174793" y="6660549"/>
-            <a:ext cx="2521179" cy="1176749"/>
-          </a:xfrm>
-          <a:prstGeom prst="rect">
-            <a:avLst/>
-          </a:prstGeom>
-          <a:noFill/>
-          <a:ln w="25400" cap="flat" cmpd="sng" algn="ctr">
-            <a:solidFill>
-              <a:srgbClr val="4F81BD">
-                <a:shade val="15000"/>
-              </a:srgbClr>
-            </a:solidFill>
-            <a:prstDash val="solid"/>
-          </a:ln>
-          <a:effectLst>
-            <a:glow rad="63500">
-              <a:srgbClr val="4F81BD">
-                <a:satMod val="175000"/>
-                <a:alpha val="40000"/>
-              </a:srgbClr>
-            </a:glow>
-          </a:effectLst>
-        </p:spPr>
-        <p:txBody>
-          <a:bodyPr rtlCol="0" anchor="ctr"/>
-          <a:lstStyle/>
-          <a:p>
-            <a:pPr marL="0" marR="0" lvl="0" indent="0" defTabSz="914400" eaLnBrk="0" fontAlgn="auto" latinLnBrk="0" hangingPunct="0">
-              <a:lnSpc>
-                <a:spcPct val="100000"/>
-              </a:lnSpc>
-              <a:spcBef>
-                <a:spcPts val="0"/>
-              </a:spcBef>
-              <a:spcAft>
-                <a:spcPts val="0"/>
-              </a:spcAft>
-              <a:buClrTx/>
-              <a:buSzTx/>
-              <a:buFontTx/>
-              <a:buNone/>
-              <a:tabLst/>
-              <a:defRPr/>
-            </a:pPr>
-            <a:r>
-              <a:rPr kumimoji="0" lang="en-GB" sz="1800" b="1" i="0" u="none" strike="noStrike" kern="0" cap="none" spc="0" normalizeH="0" baseline="0" noProof="0" dirty="0">
-                <a:ln>
-                  <a:noFill/>
-                </a:ln>
-                <a:solidFill>
-                  <a:srgbClr val="1F497D">
-                    <a:lumMod val="50000"/>
-                  </a:srgbClr>
-                </a:solidFill>
-                <a:effectLst/>
-                <a:uLnTx/>
-                <a:uFillTx/>
-                <a:latin typeface="Arial"/>
-                <a:ea typeface="+mn-ea"/>
-                <a:cs typeface="+mn-cs"/>
-              </a:rPr>
-              <a:t>RMSE: 0.42</a:t>
-            </a:r>
-          </a:p>
-          <a:p>
-            <a:pPr marL="0" marR="0" lvl="0" indent="0" defTabSz="914400" eaLnBrk="0" fontAlgn="auto" latinLnBrk="0" hangingPunct="0">
-              <a:lnSpc>
-                <a:spcPct val="100000"/>
-              </a:lnSpc>
-              <a:spcBef>
-                <a:spcPts val="0"/>
-              </a:spcBef>
-              <a:spcAft>
-                <a:spcPts val="0"/>
-              </a:spcAft>
-              <a:buClrTx/>
-              <a:buSzTx/>
-              <a:buFontTx/>
-              <a:buNone/>
-              <a:tabLst/>
-              <a:defRPr/>
-            </a:pPr>
-            <a:r>
-              <a:rPr kumimoji="0" lang="en-GB" sz="1800" b="1" i="0" u="none" strike="noStrike" kern="0" cap="none" spc="0" normalizeH="0" baseline="0" noProof="0" dirty="0">
-                <a:ln>
-                  <a:noFill/>
-                </a:ln>
-                <a:solidFill>
-                  <a:srgbClr val="1F497D">
-                    <a:lumMod val="50000"/>
-                  </a:srgbClr>
-                </a:solidFill>
-                <a:effectLst/>
-                <a:uLnTx/>
-                <a:uFillTx/>
-                <a:latin typeface="Arial"/>
-                <a:ea typeface="+mn-ea"/>
-                <a:cs typeface="+mn-cs"/>
-              </a:rPr>
-              <a:t>R-squared: 0.87</a:t>
-            </a:r>
-          </a:p>
-          <a:p>
-            <a:pPr marL="0" marR="0" lvl="0" indent="0" defTabSz="914400" eaLnBrk="0" fontAlgn="auto" latinLnBrk="0" hangingPunct="0">
-              <a:lnSpc>
-                <a:spcPct val="100000"/>
-              </a:lnSpc>
-              <a:spcBef>
-                <a:spcPts val="0"/>
-              </a:spcBef>
-              <a:spcAft>
-                <a:spcPts val="0"/>
-              </a:spcAft>
-              <a:buClrTx/>
-              <a:buSzTx/>
-              <a:buFontTx/>
-              <a:buNone/>
-              <a:tabLst/>
-              <a:defRPr/>
-            </a:pPr>
-            <a:r>
-              <a:rPr kumimoji="0" lang="en-GB" sz="1800" b="1" i="0" u="none" strike="noStrike" kern="0" cap="none" spc="0" normalizeH="0" baseline="0" noProof="0" dirty="0">
-                <a:ln>
-                  <a:noFill/>
-                </a:ln>
-                <a:solidFill>
-                  <a:srgbClr val="1F497D">
-                    <a:lumMod val="50000"/>
-                  </a:srgbClr>
-                </a:solidFill>
-                <a:effectLst/>
-                <a:uLnTx/>
-                <a:uFillTx/>
-                <a:latin typeface="Arial"/>
-                <a:ea typeface="+mn-ea"/>
-                <a:cs typeface="+mn-cs"/>
-              </a:rPr>
-              <a:t>p-value: 0.0002</a:t>
-            </a:r>
-          </a:p>
-        </p:txBody>
-      </p:sp>
-      <p:pic>
-        <p:nvPicPr>
-          <p:cNvPr id="7" name="Picture 6">
-            <a:extLst>
-              <a:ext uri="{FF2B5EF4-FFF2-40B4-BE49-F238E27FC236}">
-                <a16:creationId xmlns:a16="http://schemas.microsoft.com/office/drawing/2014/main" id="{73F8BE17-8FDB-33FE-66AC-7E52ED7B0D88}"/>
-              </a:ext>
-            </a:extLst>
-          </p:cNvPr>
-          <p:cNvPicPr>
-            <a:picLocks noChangeAspect="1"/>
-          </p:cNvPicPr>
-          <p:nvPr/>
-        </p:nvPicPr>
-        <p:blipFill>
-          <a:blip r:embed="rId3"/>
-          <a:stretch>
-            <a:fillRect/>
-          </a:stretch>
-        </p:blipFill>
-        <p:spPr>
-          <a:xfrm>
-            <a:off x="7772927" y="2313237"/>
-            <a:ext cx="5458450" cy="4160081"/>
-          </a:xfrm>
-          <a:prstGeom prst="rect">
-            <a:avLst/>
-          </a:prstGeom>
-        </p:spPr>
-      </p:pic>
-    </p:spTree>
-    <p:extLst>
-      <p:ext uri="{BB962C8B-B14F-4D97-AF65-F5344CB8AC3E}">
-        <p14:creationId xmlns:p14="http://schemas.microsoft.com/office/powerpoint/2010/main" val="2727579340"/>
-      </p:ext>
-    </p:extLst>
-  </p:cSld>
-  <p:clrMapOvr>
-    <a:masterClrMapping/>
-  </p:clrMapOvr>
-</p:sld>
-</file>
-
-<file path=ppt/slides/slide22.xml><?xml version="1.0" encoding="utf-8"?>
-<p:sld xmlns:a="http://schemas.openxmlformats.org/drawingml/2006/main" xmlns:r="http://schemas.openxmlformats.org/officeDocument/2006/relationships" xmlns:p="http://schemas.openxmlformats.org/presentationml/2006/main">
-  <p:cSld>
-    <p:spTree>
-      <p:nvGrpSpPr>
-        <p:cNvPr id="1" name="">
-          <a:extLst>
-            <a:ext uri="{FF2B5EF4-FFF2-40B4-BE49-F238E27FC236}">
               <a16:creationId xmlns:a16="http://schemas.microsoft.com/office/drawing/2014/main" id="{A912C2C6-AFA7-8427-16C3-F8E09A27BBF3}"/>
             </a:ext>
           </a:extLst>
@@ -20241,7 +19764,7 @@
           <a:p>
             <a:fld id="{C92FC937-38D6-4B8F-AEB3-E5F6C110AD7F}" type="slidenum">
               <a:rPr lang="hr-HR" smtClean="0"/>
-              <a:t>22</a:t>
+              <a:t>21</a:t>
             </a:fld>
             <a:endParaRPr lang="hr-HR"/>
           </a:p>
@@ -20278,601 +19801,28 @@
             </a:pPr>
             <a:r>
               <a:rPr lang="hr-HR" b="1" dirty="0"/>
-              <a:t>Rezultati</a:t>
+              <a:t>Rezultati -&gt; Estimacija </a:t>
+            </a:r>
+            <a:r>
+              <a:rPr lang="hr-HR" b="1" dirty="0" err="1"/>
+              <a:t>startle</a:t>
+            </a:r>
+            <a:r>
+              <a:rPr lang="hr-HR" b="1" dirty="0"/>
+              <a:t> performansi na temelju </a:t>
+            </a:r>
+            <a:r>
+              <a:rPr lang="hr-HR" b="1" dirty="0" err="1"/>
+              <a:t>startle</a:t>
+            </a:r>
+            <a:r>
+              <a:rPr lang="hr-HR" b="1" dirty="0"/>
+              <a:t> fizioloških značajki </a:t>
             </a:r>
             <a:endParaRPr lang="hr-HR" b="1" u="sng" dirty="0"/>
           </a:p>
         </p:txBody>
       </p:sp>
-      <p:pic>
-        <p:nvPicPr>
-          <p:cNvPr id="5" name="Picture 4">
-            <a:extLst>
-              <a:ext uri="{FF2B5EF4-FFF2-40B4-BE49-F238E27FC236}">
-                <a16:creationId xmlns:a16="http://schemas.microsoft.com/office/drawing/2014/main" id="{E339D5E4-0AA5-878F-818D-85FE443E0033}"/>
-              </a:ext>
-            </a:extLst>
-          </p:cNvPr>
-          <p:cNvPicPr>
-            <a:picLocks noChangeAspect="1"/>
-          </p:cNvPicPr>
-          <p:nvPr/>
-        </p:nvPicPr>
-        <p:blipFill>
-          <a:blip r:embed="rId2">
-            <a:extLst>
-              <a:ext uri="{28A0092B-C50C-407E-A947-70E740481C1C}">
-                <a14:useLocalDpi xmlns:a14="http://schemas.microsoft.com/office/drawing/2010/main" val="0"/>
-              </a:ext>
-            </a:extLst>
-          </a:blip>
-          <a:srcRect/>
-          <a:stretch/>
-        </p:blipFill>
-        <p:spPr>
-          <a:xfrm>
-            <a:off x="384538" y="2055113"/>
-            <a:ext cx="7320387" cy="6051655"/>
-          </a:xfrm>
-          <a:prstGeom prst="rect">
-            <a:avLst/>
-          </a:prstGeom>
-        </p:spPr>
-      </p:pic>
-      <p:sp>
-        <p:nvSpPr>
-          <p:cNvPr id="6" name="Rectangle 5">
-            <a:extLst>
-              <a:ext uri="{FF2B5EF4-FFF2-40B4-BE49-F238E27FC236}">
-                <a16:creationId xmlns:a16="http://schemas.microsoft.com/office/drawing/2014/main" id="{E483603B-8A19-3249-AFEE-D66F31AF4938}"/>
-              </a:ext>
-            </a:extLst>
-          </p:cNvPr>
-          <p:cNvSpPr/>
-          <p:nvPr/>
-        </p:nvSpPr>
-        <p:spPr>
-          <a:xfrm>
-            <a:off x="8174793" y="6660549"/>
-            <a:ext cx="2521179" cy="1176749"/>
-          </a:xfrm>
-          <a:prstGeom prst="rect">
-            <a:avLst/>
-          </a:prstGeom>
-          <a:noFill/>
-          <a:ln w="25400" cap="flat" cmpd="sng" algn="ctr">
-            <a:solidFill>
-              <a:srgbClr val="4F81BD">
-                <a:shade val="15000"/>
-              </a:srgbClr>
-            </a:solidFill>
-            <a:prstDash val="solid"/>
-          </a:ln>
-          <a:effectLst>
-            <a:glow rad="63500">
-              <a:srgbClr val="4F81BD">
-                <a:satMod val="175000"/>
-                <a:alpha val="40000"/>
-              </a:srgbClr>
-            </a:glow>
-          </a:effectLst>
-        </p:spPr>
-        <p:txBody>
-          <a:bodyPr rtlCol="0" anchor="ctr"/>
-          <a:lstStyle/>
-          <a:p>
-            <a:pPr marL="0" marR="0" lvl="0" indent="0" defTabSz="914400" eaLnBrk="0" fontAlgn="auto" latinLnBrk="0" hangingPunct="0">
-              <a:lnSpc>
-                <a:spcPct val="100000"/>
-              </a:lnSpc>
-              <a:spcBef>
-                <a:spcPts val="0"/>
-              </a:spcBef>
-              <a:spcAft>
-                <a:spcPts val="0"/>
-              </a:spcAft>
-              <a:buClrTx/>
-              <a:buSzTx/>
-              <a:buFontTx/>
-              <a:buNone/>
-              <a:tabLst/>
-              <a:defRPr/>
-            </a:pPr>
-            <a:r>
-              <a:rPr kumimoji="0" lang="en-GB" sz="1800" b="1" i="0" u="none" strike="noStrike" kern="0" cap="none" spc="0" normalizeH="0" baseline="0" noProof="0" dirty="0">
-                <a:ln>
-                  <a:noFill/>
-                </a:ln>
-                <a:solidFill>
-                  <a:srgbClr val="1F497D">
-                    <a:lumMod val="50000"/>
-                  </a:srgbClr>
-                </a:solidFill>
-                <a:effectLst/>
-                <a:uLnTx/>
-                <a:uFillTx/>
-                <a:latin typeface="Arial"/>
-                <a:ea typeface="+mn-ea"/>
-                <a:cs typeface="+mn-cs"/>
-              </a:rPr>
-              <a:t>RMSE: 0.42</a:t>
-            </a:r>
-          </a:p>
-          <a:p>
-            <a:pPr marL="0" marR="0" lvl="0" indent="0" defTabSz="914400" eaLnBrk="0" fontAlgn="auto" latinLnBrk="0" hangingPunct="0">
-              <a:lnSpc>
-                <a:spcPct val="100000"/>
-              </a:lnSpc>
-              <a:spcBef>
-                <a:spcPts val="0"/>
-              </a:spcBef>
-              <a:spcAft>
-                <a:spcPts val="0"/>
-              </a:spcAft>
-              <a:buClrTx/>
-              <a:buSzTx/>
-              <a:buFontTx/>
-              <a:buNone/>
-              <a:tabLst/>
-              <a:defRPr/>
-            </a:pPr>
-            <a:r>
-              <a:rPr kumimoji="0" lang="en-GB" sz="1800" b="1" i="0" u="none" strike="noStrike" kern="0" cap="none" spc="0" normalizeH="0" baseline="0" noProof="0" dirty="0">
-                <a:ln>
-                  <a:noFill/>
-                </a:ln>
-                <a:solidFill>
-                  <a:srgbClr val="1F497D">
-                    <a:lumMod val="50000"/>
-                  </a:srgbClr>
-                </a:solidFill>
-                <a:effectLst/>
-                <a:uLnTx/>
-                <a:uFillTx/>
-                <a:latin typeface="Arial"/>
-                <a:ea typeface="+mn-ea"/>
-                <a:cs typeface="+mn-cs"/>
-              </a:rPr>
-              <a:t>R-squared: 0.87</a:t>
-            </a:r>
-          </a:p>
-          <a:p>
-            <a:pPr marL="0" marR="0" lvl="0" indent="0" defTabSz="914400" eaLnBrk="0" fontAlgn="auto" latinLnBrk="0" hangingPunct="0">
-              <a:lnSpc>
-                <a:spcPct val="100000"/>
-              </a:lnSpc>
-              <a:spcBef>
-                <a:spcPts val="0"/>
-              </a:spcBef>
-              <a:spcAft>
-                <a:spcPts val="0"/>
-              </a:spcAft>
-              <a:buClrTx/>
-              <a:buSzTx/>
-              <a:buFontTx/>
-              <a:buNone/>
-              <a:tabLst/>
-              <a:defRPr/>
-            </a:pPr>
-            <a:r>
-              <a:rPr kumimoji="0" lang="en-GB" sz="1800" b="1" i="0" u="none" strike="noStrike" kern="0" cap="none" spc="0" normalizeH="0" baseline="0" noProof="0" dirty="0">
-                <a:ln>
-                  <a:noFill/>
-                </a:ln>
-                <a:solidFill>
-                  <a:srgbClr val="1F497D">
-                    <a:lumMod val="50000"/>
-                  </a:srgbClr>
-                </a:solidFill>
-                <a:effectLst/>
-                <a:uLnTx/>
-                <a:uFillTx/>
-                <a:latin typeface="Arial"/>
-                <a:ea typeface="+mn-ea"/>
-                <a:cs typeface="+mn-cs"/>
-              </a:rPr>
-              <a:t>p-value: 0.0002</a:t>
-            </a:r>
-          </a:p>
-        </p:txBody>
-      </p:sp>
-      <p:pic>
-        <p:nvPicPr>
-          <p:cNvPr id="7" name="Picture 6">
-            <a:extLst>
-              <a:ext uri="{FF2B5EF4-FFF2-40B4-BE49-F238E27FC236}">
-                <a16:creationId xmlns:a16="http://schemas.microsoft.com/office/drawing/2014/main" id="{1CFD664B-6179-9A03-6419-5F4B353D826E}"/>
-              </a:ext>
-            </a:extLst>
-          </p:cNvPr>
-          <p:cNvPicPr>
-            <a:picLocks noChangeAspect="1"/>
-          </p:cNvPicPr>
-          <p:nvPr/>
-        </p:nvPicPr>
-        <p:blipFill>
-          <a:blip r:embed="rId3"/>
-          <a:stretch>
-            <a:fillRect/>
-          </a:stretch>
-        </p:blipFill>
-        <p:spPr>
-          <a:xfrm>
-            <a:off x="7772927" y="2313237"/>
-            <a:ext cx="5458450" cy="4160081"/>
-          </a:xfrm>
-          <a:prstGeom prst="rect">
-            <a:avLst/>
-          </a:prstGeom>
-        </p:spPr>
-      </p:pic>
-    </p:spTree>
-    <p:extLst>
-      <p:ext uri="{BB962C8B-B14F-4D97-AF65-F5344CB8AC3E}">
-        <p14:creationId xmlns:p14="http://schemas.microsoft.com/office/powerpoint/2010/main" val="2821260675"/>
-      </p:ext>
-    </p:extLst>
-  </p:cSld>
-  <p:clrMapOvr>
-    <a:masterClrMapping/>
-  </p:clrMapOvr>
-</p:sld>
-</file>
-
-<file path=ppt/slides/slide23.xml><?xml version="1.0" encoding="utf-8"?>
-<p:sld xmlns:a="http://schemas.openxmlformats.org/drawingml/2006/main" xmlns:r="http://schemas.openxmlformats.org/officeDocument/2006/relationships" xmlns:p="http://schemas.openxmlformats.org/presentationml/2006/main">
-  <p:cSld>
-    <p:spTree>
-      <p:nvGrpSpPr>
-        <p:cNvPr id="1" name="">
-          <a:extLst>
-            <a:ext uri="{FF2B5EF4-FFF2-40B4-BE49-F238E27FC236}">
-              <a16:creationId xmlns:a16="http://schemas.microsoft.com/office/drawing/2014/main" id="{A912C2C6-AFA7-8427-16C3-F8E09A27BBF3}"/>
-            </a:ext>
-          </a:extLst>
-        </p:cNvPr>
-        <p:cNvGrpSpPr/>
-        <p:nvPr/>
-      </p:nvGrpSpPr>
-      <p:grpSpPr>
-        <a:xfrm>
-          <a:off x="0" y="0"/>
-          <a:ext cx="0" cy="0"/>
-          <a:chOff x="0" y="0"/>
-          <a:chExt cx="0" cy="0"/>
-        </a:xfrm>
-      </p:grpSpPr>
-      <p:sp>
-        <p:nvSpPr>
-          <p:cNvPr id="2" name="Title 1">
-            <a:extLst>
-              <a:ext uri="{FF2B5EF4-FFF2-40B4-BE49-F238E27FC236}">
-                <a16:creationId xmlns:a16="http://schemas.microsoft.com/office/drawing/2014/main" id="{A9EE9EC7-8C37-44E6-1F26-BC763070FBDB}"/>
-              </a:ext>
-            </a:extLst>
-          </p:cNvPr>
-          <p:cNvSpPr>
-            <a:spLocks noGrp="1"/>
-          </p:cNvSpPr>
-          <p:nvPr>
-            <p:ph type="title"/>
-          </p:nvPr>
-        </p:nvSpPr>
-        <p:spPr>
-          <a:xfrm>
-            <a:off x="0" y="458576"/>
-            <a:ext cx="14630400" cy="892552"/>
-          </a:xfrm>
-        </p:spPr>
-        <p:txBody>
-          <a:bodyPr/>
-          <a:lstStyle/>
-          <a:p>
-            <a:r>
-              <a:rPr lang="en-GB" sz="2600" dirty="0" err="1"/>
-              <a:t>Razvoj</a:t>
-            </a:r>
-            <a:r>
-              <a:rPr lang="en-GB" sz="2600" dirty="0"/>
-              <a:t> </a:t>
-            </a:r>
-            <a:r>
-              <a:rPr lang="hr-HR" sz="2600" dirty="0"/>
-              <a:t>neuronske mreže</a:t>
-            </a:r>
-            <a:r>
-              <a:rPr lang="en-GB" sz="2600" dirty="0"/>
-              <a:t> za </a:t>
-            </a:r>
-            <a:r>
-              <a:rPr lang="en-GB" sz="2600" dirty="0" err="1"/>
-              <a:t>estimaciju</a:t>
-            </a:r>
-            <a:r>
-              <a:rPr lang="en-GB" sz="2600" dirty="0"/>
-              <a:t>/</a:t>
-            </a:r>
-            <a:r>
-              <a:rPr lang="en-GB" sz="2600" dirty="0" err="1"/>
-              <a:t>predikciju</a:t>
-            </a:r>
-            <a:r>
-              <a:rPr lang="en-GB" sz="2600" dirty="0"/>
-              <a:t> </a:t>
-            </a:r>
-            <a:r>
-              <a:rPr lang="en-GB" sz="2600" dirty="0" err="1"/>
-              <a:t>performansi</a:t>
-            </a:r>
-            <a:r>
-              <a:rPr lang="en-GB" sz="2600" dirty="0"/>
-              <a:t> </a:t>
-            </a:r>
-            <a:r>
-              <a:rPr lang="en-GB" sz="2600" dirty="0" err="1"/>
-              <a:t>na</a:t>
-            </a:r>
-            <a:r>
-              <a:rPr lang="en-GB" sz="2600" dirty="0"/>
-              <a:t> </a:t>
-            </a:r>
-            <a:r>
-              <a:rPr lang="en-GB" sz="2600" dirty="0" err="1"/>
-              <a:t>simulatoru</a:t>
-            </a:r>
-            <a:r>
-              <a:rPr lang="en-GB" sz="2600" dirty="0"/>
-              <a:t> </a:t>
-            </a:r>
-            <a:r>
-              <a:rPr lang="en-GB" sz="2600" dirty="0" err="1"/>
-              <a:t>leta</a:t>
-            </a:r>
-            <a:r>
-              <a:rPr lang="en-GB" sz="2600" dirty="0"/>
-              <a:t> u startle </a:t>
-            </a:r>
-            <a:r>
-              <a:rPr lang="en-GB" sz="2600" dirty="0" err="1"/>
-              <a:t>uvjetima</a:t>
-            </a:r>
-            <a:r>
-              <a:rPr lang="en-GB" sz="2600" dirty="0"/>
-              <a:t> </a:t>
-            </a:r>
-            <a:r>
-              <a:rPr lang="en-GB" sz="2600" dirty="0" err="1"/>
-              <a:t>na</a:t>
-            </a:r>
-            <a:r>
-              <a:rPr lang="en-GB" sz="2600" dirty="0"/>
-              <a:t> </a:t>
-            </a:r>
-            <a:r>
-              <a:rPr lang="en-GB" sz="2600" dirty="0" err="1"/>
-              <a:t>temelju</a:t>
-            </a:r>
-            <a:r>
-              <a:rPr lang="en-GB" sz="2600" dirty="0"/>
-              <a:t> </a:t>
-            </a:r>
-            <a:r>
-              <a:rPr lang="en-GB" sz="2600" dirty="0" err="1"/>
-              <a:t>signala</a:t>
-            </a:r>
-            <a:r>
-              <a:rPr lang="en-GB" sz="2600" dirty="0"/>
-              <a:t> </a:t>
-            </a:r>
-            <a:r>
-              <a:rPr lang="en-GB" sz="2600" dirty="0" err="1"/>
-              <a:t>vodljivosti</a:t>
-            </a:r>
-            <a:r>
-              <a:rPr lang="en-GB" sz="2600" dirty="0"/>
-              <a:t> </a:t>
-            </a:r>
-            <a:r>
-              <a:rPr lang="en-GB" sz="2600" dirty="0" err="1"/>
-              <a:t>kože</a:t>
-            </a:r>
-            <a:r>
-              <a:rPr lang="hr-HR" sz="2600" dirty="0"/>
-              <a:t> </a:t>
-            </a:r>
-            <a:r>
-              <a:rPr lang="en-GB" sz="2600" dirty="0" err="1"/>
-              <a:t>i</a:t>
-            </a:r>
-            <a:r>
-              <a:rPr lang="en-GB" sz="2600" dirty="0"/>
-              <a:t> </a:t>
-            </a:r>
-            <a:r>
-              <a:rPr lang="en-GB" sz="2600" dirty="0" err="1"/>
-              <a:t>disanja</a:t>
-            </a:r>
-            <a:endParaRPr lang="en-GB" sz="2600" dirty="0"/>
-          </a:p>
-        </p:txBody>
-      </p:sp>
-      <p:sp>
-        <p:nvSpPr>
-          <p:cNvPr id="4" name="Slide Number Placeholder 3">
-            <a:extLst>
-              <a:ext uri="{FF2B5EF4-FFF2-40B4-BE49-F238E27FC236}">
-                <a16:creationId xmlns:a16="http://schemas.microsoft.com/office/drawing/2014/main" id="{93248EBF-2C68-E77F-15D3-16E6E553F12C}"/>
-              </a:ext>
-            </a:extLst>
-          </p:cNvPr>
-          <p:cNvSpPr>
-            <a:spLocks noGrp="1"/>
-          </p:cNvSpPr>
-          <p:nvPr>
-            <p:ph type="sldNum" sz="quarter" idx="10"/>
-          </p:nvPr>
-        </p:nvSpPr>
-        <p:spPr/>
-        <p:txBody>
-          <a:bodyPr/>
-          <a:lstStyle/>
-          <a:p>
-            <a:fld id="{C92FC937-38D6-4B8F-AEB3-E5F6C110AD7F}" type="slidenum">
-              <a:rPr lang="hr-HR" smtClean="0"/>
-              <a:t>23</a:t>
-            </a:fld>
-            <a:endParaRPr lang="hr-HR"/>
-          </a:p>
-        </p:txBody>
-      </p:sp>
-      <p:sp>
-        <p:nvSpPr>
-          <p:cNvPr id="8" name="Content Placeholder 7">
-            <a:extLst>
-              <a:ext uri="{FF2B5EF4-FFF2-40B4-BE49-F238E27FC236}">
-                <a16:creationId xmlns:a16="http://schemas.microsoft.com/office/drawing/2014/main" id="{BA0D86CB-6D61-62FA-3BBE-3522F808FCDE}"/>
-              </a:ext>
-            </a:extLst>
-          </p:cNvPr>
-          <p:cNvSpPr>
-            <a:spLocks noGrp="1"/>
-          </p:cNvSpPr>
-          <p:nvPr>
-            <p:ph idx="1"/>
-          </p:nvPr>
-        </p:nvSpPr>
-        <p:spPr>
-          <a:xfrm>
-            <a:off x="316536" y="1694642"/>
-            <a:ext cx="13980855" cy="394595"/>
-          </a:xfrm>
-        </p:spPr>
-        <p:txBody>
-          <a:bodyPr/>
-          <a:lstStyle/>
-          <a:p>
-            <a:pPr marL="0" indent="0">
-              <a:buNone/>
-            </a:pPr>
-            <a:r>
-              <a:rPr lang="hr-HR" b="1" dirty="0"/>
-              <a:t>Rezultati</a:t>
-            </a:r>
-            <a:endParaRPr lang="hr-HR" b="1" u="sng" dirty="0"/>
-          </a:p>
-        </p:txBody>
-      </p:sp>
-      <p:pic>
-        <p:nvPicPr>
-          <p:cNvPr id="10" name="Picture 9">
-            <a:extLst>
-              <a:ext uri="{FF2B5EF4-FFF2-40B4-BE49-F238E27FC236}">
-                <a16:creationId xmlns:a16="http://schemas.microsoft.com/office/drawing/2014/main" id="{BA2D46B3-A074-0D83-086A-7526E4954F39}"/>
-              </a:ext>
-            </a:extLst>
-          </p:cNvPr>
-          <p:cNvPicPr>
-            <a:picLocks noChangeAspect="1"/>
-          </p:cNvPicPr>
-          <p:nvPr/>
-        </p:nvPicPr>
-        <p:blipFill>
-          <a:blip r:embed="rId2">
-            <a:extLst>
-              <a:ext uri="{28A0092B-C50C-407E-A947-70E740481C1C}">
-                <a14:useLocalDpi xmlns:a14="http://schemas.microsoft.com/office/drawing/2010/main" val="0"/>
-              </a:ext>
-            </a:extLst>
-          </a:blip>
-          <a:srcRect/>
-          <a:stretch/>
-        </p:blipFill>
-        <p:spPr>
-          <a:xfrm>
-            <a:off x="7818120" y="3192732"/>
-            <a:ext cx="5837815" cy="4695964"/>
-          </a:xfrm>
-          <a:prstGeom prst="rect">
-            <a:avLst/>
-          </a:prstGeom>
-        </p:spPr>
-      </p:pic>
-      <p:pic>
-        <p:nvPicPr>
-          <p:cNvPr id="11" name="Picture 10">
-            <a:extLst>
-              <a:ext uri="{FF2B5EF4-FFF2-40B4-BE49-F238E27FC236}">
-                <a16:creationId xmlns:a16="http://schemas.microsoft.com/office/drawing/2014/main" id="{2BBD4B5D-E80A-CC55-D245-901E9EC28C22}"/>
-              </a:ext>
-            </a:extLst>
-          </p:cNvPr>
-          <p:cNvPicPr>
-            <a:picLocks noChangeAspect="1"/>
-          </p:cNvPicPr>
-          <p:nvPr/>
-        </p:nvPicPr>
-        <p:blipFill>
-          <a:blip r:embed="rId3"/>
-          <a:srcRect r="14546"/>
-          <a:stretch/>
-        </p:blipFill>
-        <p:spPr>
-          <a:xfrm>
-            <a:off x="11658240" y="5540713"/>
-            <a:ext cx="2664613" cy="1646599"/>
-          </a:xfrm>
-          <a:prstGeom prst="rect">
-            <a:avLst/>
-          </a:prstGeom>
-          <a:ln w="38100">
-            <a:solidFill>
-              <a:srgbClr val="F9D448"/>
-            </a:solidFill>
-          </a:ln>
-          <a:effectLst>
-            <a:glow rad="101600">
-              <a:srgbClr val="F9D448">
-                <a:alpha val="60000"/>
-              </a:srgbClr>
-            </a:glow>
-          </a:effectLst>
-        </p:spPr>
-      </p:pic>
-      <p:pic>
-        <p:nvPicPr>
-          <p:cNvPr id="12" name="Picture 11">
-            <a:extLst>
-              <a:ext uri="{FF2B5EF4-FFF2-40B4-BE49-F238E27FC236}">
-                <a16:creationId xmlns:a16="http://schemas.microsoft.com/office/drawing/2014/main" id="{C4F105AA-B675-F29F-E7D8-8E28F53BDCA6}"/>
-              </a:ext>
-            </a:extLst>
-          </p:cNvPr>
-          <p:cNvPicPr>
-            <a:picLocks noChangeAspect="1"/>
-          </p:cNvPicPr>
-          <p:nvPr/>
-        </p:nvPicPr>
-        <p:blipFill>
-          <a:blip r:embed="rId4">
-            <a:extLst>
-              <a:ext uri="{28A0092B-C50C-407E-A947-70E740481C1C}">
-                <a14:useLocalDpi xmlns:a14="http://schemas.microsoft.com/office/drawing/2010/main" val="0"/>
-              </a:ext>
-            </a:extLst>
-          </a:blip>
-          <a:srcRect/>
-          <a:stretch/>
-        </p:blipFill>
-        <p:spPr>
-          <a:xfrm>
-            <a:off x="307548" y="3244132"/>
-            <a:ext cx="5760038" cy="4593167"/>
-          </a:xfrm>
-          <a:prstGeom prst="rect">
-            <a:avLst/>
-          </a:prstGeom>
-        </p:spPr>
-      </p:pic>
       <p:sp>
         <p:nvSpPr>
           <p:cNvPr id="13" name="TextBox 12">
@@ -21025,10 +19975,10 @@
       </p:sp>
       <p:pic>
         <p:nvPicPr>
-          <p:cNvPr id="15" name="Picture 14">
+          <p:cNvPr id="23" name="Slika 22">
             <a:extLst>
               <a:ext uri="{FF2B5EF4-FFF2-40B4-BE49-F238E27FC236}">
-                <a16:creationId xmlns:a16="http://schemas.microsoft.com/office/drawing/2014/main" id="{09F4E4C0-EFDF-640E-8436-27418AA9B102}"/>
+                <a16:creationId xmlns:a16="http://schemas.microsoft.com/office/drawing/2014/main" id="{3E4F29D5-738C-1157-46DD-632355C2D5D1}"/>
               </a:ext>
             </a:extLst>
           </p:cNvPr>
@@ -21038,99 +19988,1323 @@
           <p:nvPr/>
         </p:nvPicPr>
         <p:blipFill>
-          <a:blip r:embed="rId5"/>
+          <a:blip r:embed="rId2">
+            <a:extLst>
+              <a:ext uri="{28A0092B-C50C-407E-A947-70E740481C1C}">
+                <a14:useLocalDpi xmlns:a14="http://schemas.microsoft.com/office/drawing/2010/main" val="0"/>
+              </a:ext>
+            </a:extLst>
+          </a:blip>
           <a:stretch>
             <a:fillRect/>
           </a:stretch>
         </p:blipFill>
         <p:spPr>
           <a:xfrm>
-            <a:off x="3096866" y="6241336"/>
-            <a:ext cx="4344066" cy="787576"/>
+            <a:off x="1743570" y="5140276"/>
+            <a:ext cx="2987040" cy="129540"/>
           </a:xfrm>
           <a:prstGeom prst="rect">
             <a:avLst/>
           </a:prstGeom>
-          <a:ln w="28575">
-            <a:solidFill>
-              <a:schemeClr val="bg1"/>
-            </a:solidFill>
-          </a:ln>
-          <a:effectLst>
-            <a:glow rad="101600">
-              <a:schemeClr val="bg1">
-                <a:alpha val="60000"/>
-              </a:schemeClr>
-            </a:glow>
-          </a:effectLst>
         </p:spPr>
       </p:pic>
-      <p:sp>
-        <p:nvSpPr>
-          <p:cNvPr id="3" name="Rectangle 2">
+      <p:pic>
+        <p:nvPicPr>
+          <p:cNvPr id="25" name="Slika 24" descr="Slika na kojoj se prikazuje snimka zaslona, dijagram, crta, radnja&#10;&#10;Opis je automatski generiran">
             <a:extLst>
               <a:ext uri="{FF2B5EF4-FFF2-40B4-BE49-F238E27FC236}">
-                <a16:creationId xmlns:a16="http://schemas.microsoft.com/office/drawing/2014/main" id="{FBE380AC-82EA-4205-CDBC-A523524C8515}"/>
+                <a16:creationId xmlns:a16="http://schemas.microsoft.com/office/drawing/2014/main" id="{5D1E1F01-E4C9-E0FC-B1F3-94043745A814}"/>
               </a:ext>
             </a:extLst>
           </p:cNvPr>
-          <p:cNvSpPr/>
+          <p:cNvPicPr>
+            <a:picLocks noChangeAspect="1"/>
+          </p:cNvPicPr>
+          <p:nvPr/>
+        </p:nvPicPr>
+        <p:blipFill>
+          <a:blip r:embed="rId3">
+            <a:extLst>
+              <a:ext uri="{28A0092B-C50C-407E-A947-70E740481C1C}">
+                <a14:useLocalDpi xmlns:a14="http://schemas.microsoft.com/office/drawing/2010/main" val="0"/>
+              </a:ext>
+            </a:extLst>
+          </a:blip>
+          <a:stretch>
+            <a:fillRect/>
+          </a:stretch>
+        </p:blipFill>
+        <p:spPr>
+          <a:xfrm>
+            <a:off x="822960" y="3177195"/>
+            <a:ext cx="5128260" cy="3855720"/>
+          </a:xfrm>
+          <a:prstGeom prst="rect">
+            <a:avLst/>
+          </a:prstGeom>
+        </p:spPr>
+      </p:pic>
+      <p:pic>
+        <p:nvPicPr>
+          <p:cNvPr id="27" name="Slika 26">
+            <a:extLst>
+              <a:ext uri="{FF2B5EF4-FFF2-40B4-BE49-F238E27FC236}">
+                <a16:creationId xmlns:a16="http://schemas.microsoft.com/office/drawing/2014/main" id="{DBB76030-2E72-31E1-F2E4-419A4E2F40F9}"/>
+              </a:ext>
+            </a:extLst>
+          </p:cNvPr>
+          <p:cNvPicPr>
+            <a:picLocks noChangeAspect="1"/>
+          </p:cNvPicPr>
+          <p:nvPr/>
+        </p:nvPicPr>
+        <p:blipFill>
+          <a:blip r:embed="rId2">
+            <a:extLst>
+              <a:ext uri="{28A0092B-C50C-407E-A947-70E740481C1C}">
+                <a14:useLocalDpi xmlns:a14="http://schemas.microsoft.com/office/drawing/2010/main" val="0"/>
+              </a:ext>
+            </a:extLst>
+          </a:blip>
+          <a:stretch>
+            <a:fillRect/>
+          </a:stretch>
+        </p:blipFill>
+        <p:spPr>
+          <a:xfrm>
+            <a:off x="1043359" y="7232897"/>
+            <a:ext cx="4984409" cy="216161"/>
+          </a:xfrm>
+          <a:prstGeom prst="rect">
+            <a:avLst/>
+          </a:prstGeom>
+        </p:spPr>
+      </p:pic>
+      <p:pic>
+        <p:nvPicPr>
+          <p:cNvPr id="29" name="Slika 28" descr="Slika na kojoj se prikazuje dijagram, crta, snimka zaslona, radnja&#10;&#10;Opis je automatski generiran">
+            <a:extLst>
+              <a:ext uri="{FF2B5EF4-FFF2-40B4-BE49-F238E27FC236}">
+                <a16:creationId xmlns:a16="http://schemas.microsoft.com/office/drawing/2014/main" id="{719431B9-66FC-D3BD-87F0-1AF5CB5A7E52}"/>
+              </a:ext>
+            </a:extLst>
+          </p:cNvPr>
+          <p:cNvPicPr>
+            <a:picLocks noChangeAspect="1"/>
+          </p:cNvPicPr>
+          <p:nvPr/>
+        </p:nvPicPr>
+        <p:blipFill>
+          <a:blip r:embed="rId4">
+            <a:extLst>
+              <a:ext uri="{28A0092B-C50C-407E-A947-70E740481C1C}">
+                <a14:useLocalDpi xmlns:a14="http://schemas.microsoft.com/office/drawing/2010/main" val="0"/>
+              </a:ext>
+            </a:extLst>
+          </a:blip>
+          <a:stretch>
+            <a:fillRect/>
+          </a:stretch>
+        </p:blipFill>
+        <p:spPr>
+          <a:xfrm>
+            <a:off x="8458201" y="3216226"/>
+            <a:ext cx="5052060" cy="3848100"/>
+          </a:xfrm>
+          <a:prstGeom prst="rect">
+            <a:avLst/>
+          </a:prstGeom>
+        </p:spPr>
+      </p:pic>
+      <p:pic>
+        <p:nvPicPr>
+          <p:cNvPr id="31" name="Slika 30" descr="Slika na kojoj se prikazuje tekst, Font, snimka zaslona&#10;&#10;Opis je automatski generiran">
+            <a:extLst>
+              <a:ext uri="{FF2B5EF4-FFF2-40B4-BE49-F238E27FC236}">
+                <a16:creationId xmlns:a16="http://schemas.microsoft.com/office/drawing/2014/main" id="{5FB73727-AFFF-C7A0-473E-82DBFB3045B4}"/>
+              </a:ext>
+            </a:extLst>
+          </p:cNvPr>
+          <p:cNvPicPr>
+            <a:picLocks noChangeAspect="1"/>
+          </p:cNvPicPr>
+          <p:nvPr/>
+        </p:nvPicPr>
+        <p:blipFill>
+          <a:blip r:embed="rId5">
+            <a:extLst>
+              <a:ext uri="{28A0092B-C50C-407E-A947-70E740481C1C}">
+                <a14:useLocalDpi xmlns:a14="http://schemas.microsoft.com/office/drawing/2010/main" val="0"/>
+              </a:ext>
+            </a:extLst>
+          </a:blip>
+          <a:stretch>
+            <a:fillRect/>
+          </a:stretch>
+        </p:blipFill>
+        <p:spPr>
+          <a:xfrm>
+            <a:off x="9442501" y="7150845"/>
+            <a:ext cx="3446677" cy="712196"/>
+          </a:xfrm>
+          <a:prstGeom prst="rect">
+            <a:avLst/>
+          </a:prstGeom>
+        </p:spPr>
+      </p:pic>
+    </p:spTree>
+    <p:extLst>
+      <p:ext uri="{BB962C8B-B14F-4D97-AF65-F5344CB8AC3E}">
+        <p14:creationId xmlns:p14="http://schemas.microsoft.com/office/powerpoint/2010/main" val="903207117"/>
+      </p:ext>
+    </p:extLst>
+  </p:cSld>
+  <p:clrMapOvr>
+    <a:masterClrMapping/>
+  </p:clrMapOvr>
+</p:sld>
+</file>
+
+<file path=ppt/slides/slide22.xml><?xml version="1.0" encoding="utf-8"?>
+<p:sld xmlns:a="http://schemas.openxmlformats.org/drawingml/2006/main" xmlns:r="http://schemas.openxmlformats.org/officeDocument/2006/relationships" xmlns:p="http://schemas.openxmlformats.org/presentationml/2006/main">
+  <p:cSld>
+    <p:spTree>
+      <p:nvGrpSpPr>
+        <p:cNvPr id="1" name="">
+          <a:extLst>
+            <a:ext uri="{FF2B5EF4-FFF2-40B4-BE49-F238E27FC236}">
+              <a16:creationId xmlns:a16="http://schemas.microsoft.com/office/drawing/2014/main" id="{6137BE14-7750-3E9A-DA01-86F49975E03C}"/>
+            </a:ext>
+          </a:extLst>
+        </p:cNvPr>
+        <p:cNvGrpSpPr/>
+        <p:nvPr/>
+      </p:nvGrpSpPr>
+      <p:grpSpPr>
+        <a:xfrm>
+          <a:off x="0" y="0"/>
+          <a:ext cx="0" cy="0"/>
+          <a:chOff x="0" y="0"/>
+          <a:chExt cx="0" cy="0"/>
+        </a:xfrm>
+      </p:grpSpPr>
+      <p:sp>
+        <p:nvSpPr>
+          <p:cNvPr id="2" name="Title 1">
+            <a:extLst>
+              <a:ext uri="{FF2B5EF4-FFF2-40B4-BE49-F238E27FC236}">
+                <a16:creationId xmlns:a16="http://schemas.microsoft.com/office/drawing/2014/main" id="{FD17C7CF-076D-852E-4AB9-CF2CE76AC7A0}"/>
+              </a:ext>
+            </a:extLst>
+          </p:cNvPr>
+          <p:cNvSpPr>
+            <a:spLocks noGrp="1"/>
+          </p:cNvSpPr>
+          <p:nvPr>
+            <p:ph type="title"/>
+          </p:nvPr>
+        </p:nvSpPr>
+        <p:spPr>
+          <a:xfrm>
+            <a:off x="0" y="458576"/>
+            <a:ext cx="14630400" cy="892552"/>
+          </a:xfrm>
+        </p:spPr>
+        <p:txBody>
+          <a:bodyPr/>
+          <a:lstStyle/>
+          <a:p>
+            <a:r>
+              <a:rPr lang="en-GB" sz="2600" dirty="0" err="1"/>
+              <a:t>Razvoj</a:t>
+            </a:r>
+            <a:r>
+              <a:rPr lang="en-GB" sz="2600" dirty="0"/>
+              <a:t> </a:t>
+            </a:r>
+            <a:r>
+              <a:rPr lang="hr-HR" sz="2600" dirty="0"/>
+              <a:t>neuronske mreže</a:t>
+            </a:r>
+            <a:r>
+              <a:rPr lang="en-GB" sz="2600" dirty="0"/>
+              <a:t> za </a:t>
+            </a:r>
+            <a:r>
+              <a:rPr lang="en-GB" sz="2600" dirty="0" err="1"/>
+              <a:t>estimaciju</a:t>
+            </a:r>
+            <a:r>
+              <a:rPr lang="en-GB" sz="2600" dirty="0"/>
+              <a:t>/</a:t>
+            </a:r>
+            <a:r>
+              <a:rPr lang="en-GB" sz="2600" dirty="0" err="1"/>
+              <a:t>predikciju</a:t>
+            </a:r>
+            <a:r>
+              <a:rPr lang="en-GB" sz="2600" dirty="0"/>
+              <a:t> </a:t>
+            </a:r>
+            <a:r>
+              <a:rPr lang="en-GB" sz="2600" dirty="0" err="1"/>
+              <a:t>performansi</a:t>
+            </a:r>
+            <a:r>
+              <a:rPr lang="en-GB" sz="2600" dirty="0"/>
+              <a:t> </a:t>
+            </a:r>
+            <a:r>
+              <a:rPr lang="en-GB" sz="2600" dirty="0" err="1"/>
+              <a:t>na</a:t>
+            </a:r>
+            <a:r>
+              <a:rPr lang="en-GB" sz="2600" dirty="0"/>
+              <a:t> </a:t>
+            </a:r>
+            <a:r>
+              <a:rPr lang="en-GB" sz="2600" dirty="0" err="1"/>
+              <a:t>simulatoru</a:t>
+            </a:r>
+            <a:r>
+              <a:rPr lang="en-GB" sz="2600" dirty="0"/>
+              <a:t> </a:t>
+            </a:r>
+            <a:r>
+              <a:rPr lang="en-GB" sz="2600" dirty="0" err="1"/>
+              <a:t>leta</a:t>
+            </a:r>
+            <a:r>
+              <a:rPr lang="en-GB" sz="2600" dirty="0"/>
+              <a:t> u startle </a:t>
+            </a:r>
+            <a:r>
+              <a:rPr lang="en-GB" sz="2600" dirty="0" err="1"/>
+              <a:t>uvjetima</a:t>
+            </a:r>
+            <a:r>
+              <a:rPr lang="en-GB" sz="2600" dirty="0"/>
+              <a:t> </a:t>
+            </a:r>
+            <a:r>
+              <a:rPr lang="en-GB" sz="2600" dirty="0" err="1"/>
+              <a:t>na</a:t>
+            </a:r>
+            <a:r>
+              <a:rPr lang="en-GB" sz="2600" dirty="0"/>
+              <a:t> </a:t>
+            </a:r>
+            <a:r>
+              <a:rPr lang="en-GB" sz="2600" dirty="0" err="1"/>
+              <a:t>temelju</a:t>
+            </a:r>
+            <a:r>
+              <a:rPr lang="en-GB" sz="2600" dirty="0"/>
+              <a:t> </a:t>
+            </a:r>
+            <a:r>
+              <a:rPr lang="en-GB" sz="2600" dirty="0" err="1"/>
+              <a:t>signala</a:t>
+            </a:r>
+            <a:r>
+              <a:rPr lang="en-GB" sz="2600" dirty="0"/>
+              <a:t> </a:t>
+            </a:r>
+            <a:r>
+              <a:rPr lang="en-GB" sz="2600" dirty="0" err="1"/>
+              <a:t>vodljivosti</a:t>
+            </a:r>
+            <a:r>
+              <a:rPr lang="en-GB" sz="2600" dirty="0"/>
+              <a:t> </a:t>
+            </a:r>
+            <a:r>
+              <a:rPr lang="en-GB" sz="2600" dirty="0" err="1"/>
+              <a:t>kože</a:t>
+            </a:r>
+            <a:r>
+              <a:rPr lang="hr-HR" sz="2600" dirty="0"/>
+              <a:t> </a:t>
+            </a:r>
+            <a:r>
+              <a:rPr lang="en-GB" sz="2600" dirty="0" err="1"/>
+              <a:t>i</a:t>
+            </a:r>
+            <a:r>
+              <a:rPr lang="en-GB" sz="2600" dirty="0"/>
+              <a:t> </a:t>
+            </a:r>
+            <a:r>
+              <a:rPr lang="en-GB" sz="2600" dirty="0" err="1"/>
+              <a:t>disanja</a:t>
+            </a:r>
+            <a:endParaRPr lang="en-GB" sz="2600" dirty="0"/>
+          </a:p>
+        </p:txBody>
+      </p:sp>
+      <p:sp>
+        <p:nvSpPr>
+          <p:cNvPr id="4" name="Slide Number Placeholder 3">
+            <a:extLst>
+              <a:ext uri="{FF2B5EF4-FFF2-40B4-BE49-F238E27FC236}">
+                <a16:creationId xmlns:a16="http://schemas.microsoft.com/office/drawing/2014/main" id="{1B9264F2-78B4-EB3E-6A3B-A581D538961A}"/>
+              </a:ext>
+            </a:extLst>
+          </p:cNvPr>
+          <p:cNvSpPr>
+            <a:spLocks noGrp="1"/>
+          </p:cNvSpPr>
+          <p:nvPr>
+            <p:ph type="sldNum" sz="quarter" idx="10"/>
+          </p:nvPr>
+        </p:nvSpPr>
+        <p:spPr/>
+        <p:txBody>
+          <a:bodyPr/>
+          <a:lstStyle/>
+          <a:p>
+            <a:fld id="{C92FC937-38D6-4B8F-AEB3-E5F6C110AD7F}" type="slidenum">
+              <a:rPr lang="hr-HR" smtClean="0"/>
+              <a:t>22</a:t>
+            </a:fld>
+            <a:endParaRPr lang="hr-HR"/>
+          </a:p>
+        </p:txBody>
+      </p:sp>
+      <p:sp>
+        <p:nvSpPr>
+          <p:cNvPr id="8" name="Content Placeholder 7">
+            <a:extLst>
+              <a:ext uri="{FF2B5EF4-FFF2-40B4-BE49-F238E27FC236}">
+                <a16:creationId xmlns:a16="http://schemas.microsoft.com/office/drawing/2014/main" id="{378C5F97-2A27-6BE0-7D8A-3487301D8E82}"/>
+              </a:ext>
+            </a:extLst>
+          </p:cNvPr>
+          <p:cNvSpPr>
+            <a:spLocks noGrp="1"/>
+          </p:cNvSpPr>
+          <p:nvPr>
+            <p:ph idx="1"/>
+          </p:nvPr>
+        </p:nvSpPr>
+        <p:spPr>
+          <a:xfrm>
+            <a:off x="316536" y="1694642"/>
+            <a:ext cx="13980855" cy="394595"/>
+          </a:xfrm>
+        </p:spPr>
+        <p:txBody>
+          <a:bodyPr/>
+          <a:lstStyle/>
+          <a:p>
+            <a:pPr marL="0" indent="0">
+              <a:buNone/>
+            </a:pPr>
+            <a:r>
+              <a:rPr lang="hr-HR" b="1" dirty="0"/>
+              <a:t>Rezultati -&gt; Predikcija </a:t>
+            </a:r>
+            <a:r>
+              <a:rPr lang="hr-HR" b="1" dirty="0" err="1"/>
+              <a:t>startle</a:t>
+            </a:r>
+            <a:r>
+              <a:rPr lang="hr-HR" b="1" dirty="0"/>
+              <a:t> performansi na temelju pre-</a:t>
+            </a:r>
+            <a:r>
+              <a:rPr lang="hr-HR" b="1" dirty="0" err="1"/>
+              <a:t>startle</a:t>
+            </a:r>
+            <a:r>
+              <a:rPr lang="hr-HR" b="1" dirty="0"/>
+              <a:t> fizioloških značajki</a:t>
+            </a:r>
+            <a:endParaRPr lang="hr-HR" b="1" u="sng" dirty="0"/>
+          </a:p>
+        </p:txBody>
+      </p:sp>
+      <p:sp>
+        <p:nvSpPr>
+          <p:cNvPr id="13" name="TextBox 12">
+            <a:extLst>
+              <a:ext uri="{FF2B5EF4-FFF2-40B4-BE49-F238E27FC236}">
+                <a16:creationId xmlns:a16="http://schemas.microsoft.com/office/drawing/2014/main" id="{1D494749-E872-67FC-474B-BDBE6A218010}"/>
+              </a:ext>
+            </a:extLst>
+          </p:cNvPr>
+          <p:cNvSpPr txBox="1"/>
           <p:nvPr/>
         </p:nvSpPr>
         <p:spPr>
           <a:xfrm>
-            <a:off x="1749978" y="1568370"/>
-            <a:ext cx="12496800" cy="881004"/>
+            <a:off x="8458201" y="2746981"/>
+            <a:ext cx="5197733" cy="424732"/>
           </a:xfrm>
           <a:prstGeom prst="rect">
             <a:avLst/>
           </a:prstGeom>
           <a:solidFill>
-            <a:srgbClr val="C00000"/>
+            <a:srgbClr val="F9D448"/>
           </a:solidFill>
-          <a:ln>
-            <a:solidFill>
-              <a:srgbClr val="C00000"/>
-            </a:solidFill>
-          </a:ln>
         </p:spPr>
-        <p:style>
-          <a:lnRef idx="2">
-            <a:schemeClr val="accent1">
-              <a:shade val="15000"/>
-            </a:schemeClr>
-          </a:lnRef>
-          <a:fillRef idx="1">
-            <a:schemeClr val="accent1"/>
-          </a:fillRef>
-          <a:effectRef idx="0">
-            <a:schemeClr val="accent1"/>
-          </a:effectRef>
-          <a:fontRef idx="minor">
-            <a:schemeClr val="lt1"/>
-          </a:fontRef>
-        </p:style>
         <p:txBody>
-          <a:bodyPr rtlCol="0" anchor="ctr"/>
+          <a:bodyPr wrap="square">
+            <a:spAutoFit/>
+          </a:bodyPr>
           <a:lstStyle/>
           <a:p>
-            <a:pPr algn="just"/>
-            <a:r>
-              <a:rPr lang="hr-HR" sz="1600" dirty="0"/>
-              <a:t>Prethodni grafovi su prikazali model koji je treniran na cijelom skupu podataka. Kako bi ispitali generabilnost i robusnost modela primjenili smo Leave One Out Cross Validation (LOOCV), gdje se model trenira na 14 kandidata a testira na jednom, te je dana usporedba. </a:t>
-            </a:r>
-            <a:r>
-              <a:rPr lang="hr-HR" sz="1600" b="1" dirty="0"/>
-              <a:t>Isto se očekuje od vas, prilikom prezentacije vaših rezultata.</a:t>
-            </a:r>
-            <a:endParaRPr lang="en-GB" sz="1600" b="1" dirty="0"/>
+            <a:pPr algn="ctr" defTabSz="1097280" fontAlgn="auto">
+              <a:spcBef>
+                <a:spcPts val="0"/>
+              </a:spcBef>
+              <a:spcAft>
+                <a:spcPts val="0"/>
+              </a:spcAft>
+            </a:pPr>
+            <a:r>
+              <a:rPr lang="hr-HR" sz="2160" b="1" dirty="0">
+                <a:solidFill>
+                  <a:srgbClr val="000000"/>
+                </a:solidFill>
+                <a:latin typeface="Tahoma"/>
+              </a:rPr>
+              <a:t>Cross-</a:t>
+            </a:r>
+            <a:r>
+              <a:rPr lang="hr-HR" sz="2160" b="1" dirty="0" err="1">
+                <a:solidFill>
+                  <a:srgbClr val="000000"/>
+                </a:solidFill>
+                <a:latin typeface="Tahoma"/>
+              </a:rPr>
+              <a:t>validated</a:t>
+            </a:r>
+            <a:r>
+              <a:rPr lang="hr-HR" sz="2160" b="1" dirty="0">
+                <a:solidFill>
+                  <a:srgbClr val="000000"/>
+                </a:solidFill>
+                <a:latin typeface="Tahoma"/>
+              </a:rPr>
+              <a:t> MRA (LOOCV)</a:t>
+            </a:r>
+            <a:endParaRPr lang="en-GB" sz="2160" b="1" dirty="0">
+              <a:solidFill>
+                <a:srgbClr val="000000"/>
+              </a:solidFill>
+              <a:latin typeface="Tahoma"/>
+            </a:endParaRPr>
           </a:p>
         </p:txBody>
       </p:sp>
+      <p:sp>
+        <p:nvSpPr>
+          <p:cNvPr id="14" name="TextBox 13">
+            <a:extLst>
+              <a:ext uri="{FF2B5EF4-FFF2-40B4-BE49-F238E27FC236}">
+                <a16:creationId xmlns:a16="http://schemas.microsoft.com/office/drawing/2014/main" id="{84CFDC69-BB66-73DC-FB98-E88CFEE34FB6}"/>
+              </a:ext>
+            </a:extLst>
+          </p:cNvPr>
+          <p:cNvSpPr txBox="1"/>
+          <p:nvPr/>
+        </p:nvSpPr>
+        <p:spPr>
+          <a:xfrm>
+            <a:off x="822960" y="2750763"/>
+            <a:ext cx="5349240" cy="424732"/>
+          </a:xfrm>
+          <a:prstGeom prst="rect">
+            <a:avLst/>
+          </a:prstGeom>
+          <a:solidFill>
+            <a:srgbClr val="F9D448"/>
+          </a:solidFill>
+        </p:spPr>
+        <p:txBody>
+          <a:bodyPr wrap="square">
+            <a:spAutoFit/>
+          </a:bodyPr>
+          <a:lstStyle>
+            <a:defPPr>
+              <a:defRPr lang="en-US"/>
+            </a:defPPr>
+            <a:lvl1pPr algn="ctr" defTabSz="1097280" fontAlgn="auto">
+              <a:spcBef>
+                <a:spcPts val="0"/>
+              </a:spcBef>
+              <a:spcAft>
+                <a:spcPts val="0"/>
+              </a:spcAft>
+              <a:defRPr sz="2160" b="1">
+                <a:solidFill>
+                  <a:srgbClr val="000000"/>
+                </a:solidFill>
+                <a:latin typeface="Tahoma"/>
+              </a:defRPr>
+            </a:lvl1pPr>
+          </a:lstStyle>
+          <a:p>
+            <a:r>
+              <a:rPr lang="en-GB" dirty="0"/>
+              <a:t>MRA </a:t>
+            </a:r>
+            <a:r>
+              <a:rPr lang="hr-HR" dirty="0"/>
+              <a:t>fit to </a:t>
+            </a:r>
+            <a:r>
+              <a:rPr lang="hr-HR" dirty="0" err="1"/>
+              <a:t>the</a:t>
+            </a:r>
+            <a:r>
+              <a:rPr lang="hr-HR" dirty="0"/>
+              <a:t> </a:t>
+            </a:r>
+            <a:r>
+              <a:rPr lang="hr-HR" dirty="0" err="1"/>
+              <a:t>dataset</a:t>
+            </a:r>
+            <a:r>
+              <a:rPr lang="hr-HR" dirty="0"/>
+              <a:t> (no LOOCV)</a:t>
+            </a:r>
+            <a:endParaRPr lang="en-GB" dirty="0"/>
+          </a:p>
+        </p:txBody>
+      </p:sp>
+      <p:pic>
+        <p:nvPicPr>
+          <p:cNvPr id="6" name="Slika 5" descr="Slika na kojoj se prikazuje dijagram, snimka zaslona, crta, radnja&#10;&#10;Opis je automatski generiran">
+            <a:extLst>
+              <a:ext uri="{FF2B5EF4-FFF2-40B4-BE49-F238E27FC236}">
+                <a16:creationId xmlns:a16="http://schemas.microsoft.com/office/drawing/2014/main" id="{20AA9D6C-BF1F-6661-7E41-FD9499A5251F}"/>
+              </a:ext>
+            </a:extLst>
+          </p:cNvPr>
+          <p:cNvPicPr>
+            <a:picLocks noChangeAspect="1"/>
+          </p:cNvPicPr>
+          <p:nvPr/>
+        </p:nvPicPr>
+        <p:blipFill>
+          <a:blip r:embed="rId2">
+            <a:extLst>
+              <a:ext uri="{28A0092B-C50C-407E-A947-70E740481C1C}">
+                <a14:useLocalDpi xmlns:a14="http://schemas.microsoft.com/office/drawing/2010/main" val="0"/>
+              </a:ext>
+            </a:extLst>
+          </a:blip>
+          <a:stretch>
+            <a:fillRect/>
+          </a:stretch>
+        </p:blipFill>
+        <p:spPr>
+          <a:xfrm>
+            <a:off x="822960" y="3260774"/>
+            <a:ext cx="5120640" cy="3794760"/>
+          </a:xfrm>
+          <a:prstGeom prst="rect">
+            <a:avLst/>
+          </a:prstGeom>
+        </p:spPr>
+      </p:pic>
+      <p:pic>
+        <p:nvPicPr>
+          <p:cNvPr id="9" name="Slika 8">
+            <a:extLst>
+              <a:ext uri="{FF2B5EF4-FFF2-40B4-BE49-F238E27FC236}">
+                <a16:creationId xmlns:a16="http://schemas.microsoft.com/office/drawing/2014/main" id="{05D59EDD-3196-02FF-4158-532884053D8C}"/>
+              </a:ext>
+            </a:extLst>
+          </p:cNvPr>
+          <p:cNvPicPr>
+            <a:picLocks noChangeAspect="1"/>
+          </p:cNvPicPr>
+          <p:nvPr/>
+        </p:nvPicPr>
+        <p:blipFill>
+          <a:blip r:embed="rId3">
+            <a:extLst>
+              <a:ext uri="{28A0092B-C50C-407E-A947-70E740481C1C}">
+                <a14:useLocalDpi xmlns:a14="http://schemas.microsoft.com/office/drawing/2010/main" val="0"/>
+              </a:ext>
+            </a:extLst>
+          </a:blip>
+          <a:stretch>
+            <a:fillRect/>
+          </a:stretch>
+        </p:blipFill>
+        <p:spPr>
+          <a:xfrm>
+            <a:off x="1456912" y="7316155"/>
+            <a:ext cx="4151755" cy="424732"/>
+          </a:xfrm>
+          <a:prstGeom prst="rect">
+            <a:avLst/>
+          </a:prstGeom>
+        </p:spPr>
+      </p:pic>
+      <p:pic>
+        <p:nvPicPr>
+          <p:cNvPr id="11" name="Slika 10" descr="Slika na kojoj se prikazuje dijagram, snimka zaslona, crta, radnja&#10;&#10;Opis je automatski generiran">
+            <a:extLst>
+              <a:ext uri="{FF2B5EF4-FFF2-40B4-BE49-F238E27FC236}">
+                <a16:creationId xmlns:a16="http://schemas.microsoft.com/office/drawing/2014/main" id="{781EF4EB-5DCD-9193-55FB-C4F77A073A01}"/>
+              </a:ext>
+            </a:extLst>
+          </p:cNvPr>
+          <p:cNvPicPr>
+            <a:picLocks noChangeAspect="1"/>
+          </p:cNvPicPr>
+          <p:nvPr/>
+        </p:nvPicPr>
+        <p:blipFill>
+          <a:blip r:embed="rId4">
+            <a:extLst>
+              <a:ext uri="{28A0092B-C50C-407E-A947-70E740481C1C}">
+                <a14:useLocalDpi xmlns:a14="http://schemas.microsoft.com/office/drawing/2010/main" val="0"/>
+              </a:ext>
+            </a:extLst>
+          </a:blip>
+          <a:stretch>
+            <a:fillRect/>
+          </a:stretch>
+        </p:blipFill>
+        <p:spPr>
+          <a:xfrm>
+            <a:off x="8458201" y="3171713"/>
+            <a:ext cx="5105400" cy="3832860"/>
+          </a:xfrm>
+          <a:prstGeom prst="rect">
+            <a:avLst/>
+          </a:prstGeom>
+        </p:spPr>
+      </p:pic>
+      <p:pic>
+        <p:nvPicPr>
+          <p:cNvPr id="17" name="Slika 16" descr="Slika na kojoj se prikazuje tekst, Font, snimka zaslona&#10;&#10;Opis je automatski generiran">
+            <a:extLst>
+              <a:ext uri="{FF2B5EF4-FFF2-40B4-BE49-F238E27FC236}">
+                <a16:creationId xmlns:a16="http://schemas.microsoft.com/office/drawing/2014/main" id="{E697E25B-80E8-2882-DF08-E474F2562DF7}"/>
+              </a:ext>
+            </a:extLst>
+          </p:cNvPr>
+          <p:cNvPicPr>
+            <a:picLocks noChangeAspect="1"/>
+          </p:cNvPicPr>
+          <p:nvPr/>
+        </p:nvPicPr>
+        <p:blipFill>
+          <a:blip r:embed="rId5">
+            <a:extLst>
+              <a:ext uri="{28A0092B-C50C-407E-A947-70E740481C1C}">
+                <a14:useLocalDpi xmlns:a14="http://schemas.microsoft.com/office/drawing/2010/main" val="0"/>
+              </a:ext>
+            </a:extLst>
+          </a:blip>
+          <a:stretch>
+            <a:fillRect/>
+          </a:stretch>
+        </p:blipFill>
+        <p:spPr>
+          <a:xfrm>
+            <a:off x="9284099" y="7099189"/>
+            <a:ext cx="3545936" cy="741752"/>
+          </a:xfrm>
+          <a:prstGeom prst="rect">
+            <a:avLst/>
+          </a:prstGeom>
+        </p:spPr>
+      </p:pic>
     </p:spTree>
     <p:extLst>
       <p:ext uri="{BB962C8B-B14F-4D97-AF65-F5344CB8AC3E}">
-        <p14:creationId xmlns:p14="http://schemas.microsoft.com/office/powerpoint/2010/main" val="903207117"/>
+        <p14:creationId xmlns:p14="http://schemas.microsoft.com/office/powerpoint/2010/main" val="1995253445"/>
+      </p:ext>
+    </p:extLst>
+  </p:cSld>
+  <p:clrMapOvr>
+    <a:masterClrMapping/>
+  </p:clrMapOvr>
+</p:sld>
+</file>
+
+<file path=ppt/slides/slide23.xml><?xml version="1.0" encoding="utf-8"?>
+<p:sld xmlns:a="http://schemas.openxmlformats.org/drawingml/2006/main" xmlns:r="http://schemas.openxmlformats.org/officeDocument/2006/relationships" xmlns:p="http://schemas.openxmlformats.org/presentationml/2006/main">
+  <p:cSld>
+    <p:spTree>
+      <p:nvGrpSpPr>
+        <p:cNvPr id="1" name="">
+          <a:extLst>
+            <a:ext uri="{FF2B5EF4-FFF2-40B4-BE49-F238E27FC236}">
+              <a16:creationId xmlns:a16="http://schemas.microsoft.com/office/drawing/2014/main" id="{329077B1-EE54-81A9-6FEB-01573584F340}"/>
+            </a:ext>
+          </a:extLst>
+        </p:cNvPr>
+        <p:cNvGrpSpPr/>
+        <p:nvPr/>
+      </p:nvGrpSpPr>
+      <p:grpSpPr>
+        <a:xfrm>
+          <a:off x="0" y="0"/>
+          <a:ext cx="0" cy="0"/>
+          <a:chOff x="0" y="0"/>
+          <a:chExt cx="0" cy="0"/>
+        </a:xfrm>
+      </p:grpSpPr>
+      <p:sp>
+        <p:nvSpPr>
+          <p:cNvPr id="2" name="Title 1">
+            <a:extLst>
+              <a:ext uri="{FF2B5EF4-FFF2-40B4-BE49-F238E27FC236}">
+                <a16:creationId xmlns:a16="http://schemas.microsoft.com/office/drawing/2014/main" id="{EA0CB6E3-DA7E-9A2C-B734-2CFDF7BB871C}"/>
+              </a:ext>
+            </a:extLst>
+          </p:cNvPr>
+          <p:cNvSpPr>
+            <a:spLocks noGrp="1"/>
+          </p:cNvSpPr>
+          <p:nvPr>
+            <p:ph type="title"/>
+          </p:nvPr>
+        </p:nvSpPr>
+        <p:spPr>
+          <a:xfrm>
+            <a:off x="0" y="458576"/>
+            <a:ext cx="14630400" cy="892552"/>
+          </a:xfrm>
+        </p:spPr>
+        <p:txBody>
+          <a:bodyPr/>
+          <a:lstStyle/>
+          <a:p>
+            <a:r>
+              <a:rPr lang="en-GB" sz="2600" dirty="0" err="1"/>
+              <a:t>Razvoj</a:t>
+            </a:r>
+            <a:r>
+              <a:rPr lang="en-GB" sz="2600" dirty="0"/>
+              <a:t> </a:t>
+            </a:r>
+            <a:r>
+              <a:rPr lang="hr-HR" sz="2600" dirty="0"/>
+              <a:t>neuronske mreže</a:t>
+            </a:r>
+            <a:r>
+              <a:rPr lang="en-GB" sz="2600" dirty="0"/>
+              <a:t> za </a:t>
+            </a:r>
+            <a:r>
+              <a:rPr lang="en-GB" sz="2600" dirty="0" err="1"/>
+              <a:t>estimaciju</a:t>
+            </a:r>
+            <a:r>
+              <a:rPr lang="en-GB" sz="2600" dirty="0"/>
+              <a:t>/</a:t>
+            </a:r>
+            <a:r>
+              <a:rPr lang="en-GB" sz="2600" dirty="0" err="1"/>
+              <a:t>predikciju</a:t>
+            </a:r>
+            <a:r>
+              <a:rPr lang="en-GB" sz="2600" dirty="0"/>
+              <a:t> </a:t>
+            </a:r>
+            <a:r>
+              <a:rPr lang="en-GB" sz="2600" dirty="0" err="1"/>
+              <a:t>performansi</a:t>
+            </a:r>
+            <a:r>
+              <a:rPr lang="en-GB" sz="2600" dirty="0"/>
+              <a:t> </a:t>
+            </a:r>
+            <a:r>
+              <a:rPr lang="en-GB" sz="2600" dirty="0" err="1"/>
+              <a:t>na</a:t>
+            </a:r>
+            <a:r>
+              <a:rPr lang="en-GB" sz="2600" dirty="0"/>
+              <a:t> </a:t>
+            </a:r>
+            <a:r>
+              <a:rPr lang="en-GB" sz="2600" dirty="0" err="1"/>
+              <a:t>simulatoru</a:t>
+            </a:r>
+            <a:r>
+              <a:rPr lang="en-GB" sz="2600" dirty="0"/>
+              <a:t> </a:t>
+            </a:r>
+            <a:r>
+              <a:rPr lang="en-GB" sz="2600" dirty="0" err="1"/>
+              <a:t>leta</a:t>
+            </a:r>
+            <a:r>
+              <a:rPr lang="en-GB" sz="2600" dirty="0"/>
+              <a:t> u startle </a:t>
+            </a:r>
+            <a:r>
+              <a:rPr lang="en-GB" sz="2600" dirty="0" err="1"/>
+              <a:t>uvjetima</a:t>
+            </a:r>
+            <a:r>
+              <a:rPr lang="en-GB" sz="2600" dirty="0"/>
+              <a:t> </a:t>
+            </a:r>
+            <a:r>
+              <a:rPr lang="en-GB" sz="2600" dirty="0" err="1"/>
+              <a:t>na</a:t>
+            </a:r>
+            <a:r>
+              <a:rPr lang="en-GB" sz="2600" dirty="0"/>
+              <a:t> </a:t>
+            </a:r>
+            <a:r>
+              <a:rPr lang="en-GB" sz="2600" dirty="0" err="1"/>
+              <a:t>temelju</a:t>
+            </a:r>
+            <a:r>
+              <a:rPr lang="en-GB" sz="2600" dirty="0"/>
+              <a:t> </a:t>
+            </a:r>
+            <a:r>
+              <a:rPr lang="en-GB" sz="2600" dirty="0" err="1"/>
+              <a:t>signala</a:t>
+            </a:r>
+            <a:r>
+              <a:rPr lang="en-GB" sz="2600" dirty="0"/>
+              <a:t> </a:t>
+            </a:r>
+            <a:r>
+              <a:rPr lang="en-GB" sz="2600" dirty="0" err="1"/>
+              <a:t>vodljivosti</a:t>
+            </a:r>
+            <a:r>
+              <a:rPr lang="en-GB" sz="2600" dirty="0"/>
+              <a:t> </a:t>
+            </a:r>
+            <a:r>
+              <a:rPr lang="en-GB" sz="2600" dirty="0" err="1"/>
+              <a:t>kože</a:t>
+            </a:r>
+            <a:r>
+              <a:rPr lang="hr-HR" sz="2600" dirty="0"/>
+              <a:t> </a:t>
+            </a:r>
+            <a:r>
+              <a:rPr lang="en-GB" sz="2600" dirty="0" err="1"/>
+              <a:t>i</a:t>
+            </a:r>
+            <a:r>
+              <a:rPr lang="en-GB" sz="2600" dirty="0"/>
+              <a:t> </a:t>
+            </a:r>
+            <a:r>
+              <a:rPr lang="en-GB" sz="2600" dirty="0" err="1"/>
+              <a:t>disanja</a:t>
+            </a:r>
+            <a:endParaRPr lang="en-GB" sz="2600" dirty="0"/>
+          </a:p>
+        </p:txBody>
+      </p:sp>
+      <p:sp>
+        <p:nvSpPr>
+          <p:cNvPr id="4" name="Slide Number Placeholder 3">
+            <a:extLst>
+              <a:ext uri="{FF2B5EF4-FFF2-40B4-BE49-F238E27FC236}">
+                <a16:creationId xmlns:a16="http://schemas.microsoft.com/office/drawing/2014/main" id="{05C48178-EA8D-CE94-D651-28A530C0A8B9}"/>
+              </a:ext>
+            </a:extLst>
+          </p:cNvPr>
+          <p:cNvSpPr>
+            <a:spLocks noGrp="1"/>
+          </p:cNvSpPr>
+          <p:nvPr>
+            <p:ph type="sldNum" sz="quarter" idx="10"/>
+          </p:nvPr>
+        </p:nvSpPr>
+        <p:spPr/>
+        <p:txBody>
+          <a:bodyPr/>
+          <a:lstStyle/>
+          <a:p>
+            <a:fld id="{C92FC937-38D6-4B8F-AEB3-E5F6C110AD7F}" type="slidenum">
+              <a:rPr lang="hr-HR" smtClean="0"/>
+              <a:t>23</a:t>
+            </a:fld>
+            <a:endParaRPr lang="hr-HR"/>
+          </a:p>
+        </p:txBody>
+      </p:sp>
+      <p:sp>
+        <p:nvSpPr>
+          <p:cNvPr id="8" name="Content Placeholder 7">
+            <a:extLst>
+              <a:ext uri="{FF2B5EF4-FFF2-40B4-BE49-F238E27FC236}">
+                <a16:creationId xmlns:a16="http://schemas.microsoft.com/office/drawing/2014/main" id="{90510CE5-9BD8-C344-37DD-7482E116DCC7}"/>
+              </a:ext>
+            </a:extLst>
+          </p:cNvPr>
+          <p:cNvSpPr>
+            <a:spLocks noGrp="1"/>
+          </p:cNvSpPr>
+          <p:nvPr>
+            <p:ph idx="1"/>
+          </p:nvPr>
+        </p:nvSpPr>
+        <p:spPr>
+          <a:xfrm>
+            <a:off x="316536" y="1694642"/>
+            <a:ext cx="13980855" cy="696857"/>
+          </a:xfrm>
+        </p:spPr>
+        <p:txBody>
+          <a:bodyPr/>
+          <a:lstStyle/>
+          <a:p>
+            <a:pPr marL="0" indent="0">
+              <a:buNone/>
+            </a:pPr>
+            <a:r>
+              <a:rPr lang="hr-HR" b="1" dirty="0"/>
+              <a:t>Rezultati -&gt; Predikcija post-</a:t>
+            </a:r>
+            <a:r>
+              <a:rPr lang="hr-HR" b="1" dirty="0" err="1"/>
+              <a:t>startle</a:t>
+            </a:r>
+            <a:r>
+              <a:rPr lang="hr-HR" b="1" dirty="0"/>
+              <a:t> performansi na temelju pre-</a:t>
+            </a:r>
+            <a:r>
+              <a:rPr lang="hr-HR" b="1" dirty="0" err="1"/>
+              <a:t>startle</a:t>
+            </a:r>
+            <a:r>
+              <a:rPr lang="hr-HR" b="1" dirty="0"/>
+              <a:t> i </a:t>
+            </a:r>
+            <a:r>
+              <a:rPr lang="hr-HR" b="1" dirty="0" err="1"/>
+              <a:t>startle</a:t>
+            </a:r>
+            <a:r>
+              <a:rPr lang="hr-HR" b="1" dirty="0"/>
+              <a:t> fizioloških značajki te </a:t>
+            </a:r>
+            <a:r>
+              <a:rPr lang="hr-HR" b="1" dirty="0" err="1"/>
+              <a:t>startle</a:t>
+            </a:r>
+            <a:r>
+              <a:rPr lang="hr-HR" b="1" dirty="0"/>
+              <a:t> 		         performansi</a:t>
+            </a:r>
+            <a:endParaRPr lang="hr-HR" b="1" u="sng" dirty="0"/>
+          </a:p>
+        </p:txBody>
+      </p:sp>
+      <p:sp>
+        <p:nvSpPr>
+          <p:cNvPr id="13" name="TextBox 12">
+            <a:extLst>
+              <a:ext uri="{FF2B5EF4-FFF2-40B4-BE49-F238E27FC236}">
+                <a16:creationId xmlns:a16="http://schemas.microsoft.com/office/drawing/2014/main" id="{9570AA23-F2F2-14F4-3B39-15F03C12CFB3}"/>
+              </a:ext>
+            </a:extLst>
+          </p:cNvPr>
+          <p:cNvSpPr txBox="1"/>
+          <p:nvPr/>
+        </p:nvSpPr>
+        <p:spPr>
+          <a:xfrm>
+            <a:off x="8458201" y="2746981"/>
+            <a:ext cx="5197733" cy="424732"/>
+          </a:xfrm>
+          <a:prstGeom prst="rect">
+            <a:avLst/>
+          </a:prstGeom>
+          <a:solidFill>
+            <a:srgbClr val="F9D448"/>
+          </a:solidFill>
+        </p:spPr>
+        <p:txBody>
+          <a:bodyPr wrap="square">
+            <a:spAutoFit/>
+          </a:bodyPr>
+          <a:lstStyle/>
+          <a:p>
+            <a:pPr algn="ctr" defTabSz="1097280" fontAlgn="auto">
+              <a:spcBef>
+                <a:spcPts val="0"/>
+              </a:spcBef>
+              <a:spcAft>
+                <a:spcPts val="0"/>
+              </a:spcAft>
+            </a:pPr>
+            <a:r>
+              <a:rPr lang="hr-HR" sz="2160" b="1" dirty="0">
+                <a:solidFill>
+                  <a:srgbClr val="000000"/>
+                </a:solidFill>
+                <a:latin typeface="Tahoma"/>
+              </a:rPr>
+              <a:t>Cross-</a:t>
+            </a:r>
+            <a:r>
+              <a:rPr lang="hr-HR" sz="2160" b="1" dirty="0" err="1">
+                <a:solidFill>
+                  <a:srgbClr val="000000"/>
+                </a:solidFill>
+                <a:latin typeface="Tahoma"/>
+              </a:rPr>
+              <a:t>validated</a:t>
+            </a:r>
+            <a:r>
+              <a:rPr lang="hr-HR" sz="2160" b="1" dirty="0">
+                <a:solidFill>
+                  <a:srgbClr val="000000"/>
+                </a:solidFill>
+                <a:latin typeface="Tahoma"/>
+              </a:rPr>
+              <a:t> MRA (LOOCV)</a:t>
+            </a:r>
+            <a:endParaRPr lang="en-GB" sz="2160" b="1" dirty="0">
+              <a:solidFill>
+                <a:srgbClr val="000000"/>
+              </a:solidFill>
+              <a:latin typeface="Tahoma"/>
+            </a:endParaRPr>
+          </a:p>
+        </p:txBody>
+      </p:sp>
+      <p:sp>
+        <p:nvSpPr>
+          <p:cNvPr id="14" name="TextBox 13">
+            <a:extLst>
+              <a:ext uri="{FF2B5EF4-FFF2-40B4-BE49-F238E27FC236}">
+                <a16:creationId xmlns:a16="http://schemas.microsoft.com/office/drawing/2014/main" id="{AAF2C556-728A-15B7-E7A8-643E054FBF3E}"/>
+              </a:ext>
+            </a:extLst>
+          </p:cNvPr>
+          <p:cNvSpPr txBox="1"/>
+          <p:nvPr/>
+        </p:nvSpPr>
+        <p:spPr>
+          <a:xfrm>
+            <a:off x="822960" y="2750763"/>
+            <a:ext cx="5349240" cy="424732"/>
+          </a:xfrm>
+          <a:prstGeom prst="rect">
+            <a:avLst/>
+          </a:prstGeom>
+          <a:solidFill>
+            <a:srgbClr val="F9D448"/>
+          </a:solidFill>
+        </p:spPr>
+        <p:txBody>
+          <a:bodyPr wrap="square">
+            <a:spAutoFit/>
+          </a:bodyPr>
+          <a:lstStyle>
+            <a:defPPr>
+              <a:defRPr lang="en-US"/>
+            </a:defPPr>
+            <a:lvl1pPr algn="ctr" defTabSz="1097280" fontAlgn="auto">
+              <a:spcBef>
+                <a:spcPts val="0"/>
+              </a:spcBef>
+              <a:spcAft>
+                <a:spcPts val="0"/>
+              </a:spcAft>
+              <a:defRPr sz="2160" b="1">
+                <a:solidFill>
+                  <a:srgbClr val="000000"/>
+                </a:solidFill>
+                <a:latin typeface="Tahoma"/>
+              </a:defRPr>
+            </a:lvl1pPr>
+          </a:lstStyle>
+          <a:p>
+            <a:r>
+              <a:rPr lang="en-GB" dirty="0"/>
+              <a:t>MRA </a:t>
+            </a:r>
+            <a:r>
+              <a:rPr lang="hr-HR" dirty="0"/>
+              <a:t>fit to </a:t>
+            </a:r>
+            <a:r>
+              <a:rPr lang="hr-HR" dirty="0" err="1"/>
+              <a:t>the</a:t>
+            </a:r>
+            <a:r>
+              <a:rPr lang="hr-HR" dirty="0"/>
+              <a:t> </a:t>
+            </a:r>
+            <a:r>
+              <a:rPr lang="hr-HR" dirty="0" err="1"/>
+              <a:t>dataset</a:t>
+            </a:r>
+            <a:r>
+              <a:rPr lang="hr-HR" dirty="0"/>
+              <a:t> (no LOOCV)</a:t>
+            </a:r>
+            <a:endParaRPr lang="en-GB" dirty="0"/>
+          </a:p>
+        </p:txBody>
+      </p:sp>
+      <p:pic>
+        <p:nvPicPr>
+          <p:cNvPr id="6" name="Slika 5" descr="Slika na kojoj se prikazuje dijagram, crta, snimka zaslona, radnja&#10;&#10;Opis je automatski generiran">
+            <a:extLst>
+              <a:ext uri="{FF2B5EF4-FFF2-40B4-BE49-F238E27FC236}">
+                <a16:creationId xmlns:a16="http://schemas.microsoft.com/office/drawing/2014/main" id="{3F65F7A2-5E75-3E43-B6DD-BB65A1D39149}"/>
+              </a:ext>
+            </a:extLst>
+          </p:cNvPr>
+          <p:cNvPicPr>
+            <a:picLocks noChangeAspect="1"/>
+          </p:cNvPicPr>
+          <p:nvPr/>
+        </p:nvPicPr>
+        <p:blipFill>
+          <a:blip r:embed="rId2">
+            <a:extLst>
+              <a:ext uri="{28A0092B-C50C-407E-A947-70E740481C1C}">
+                <a14:useLocalDpi xmlns:a14="http://schemas.microsoft.com/office/drawing/2010/main" val="0"/>
+              </a:ext>
+            </a:extLst>
+          </a:blip>
+          <a:stretch>
+            <a:fillRect/>
+          </a:stretch>
+        </p:blipFill>
+        <p:spPr>
+          <a:xfrm>
+            <a:off x="822960" y="3277896"/>
+            <a:ext cx="5013960" cy="3794760"/>
+          </a:xfrm>
+          <a:prstGeom prst="rect">
+            <a:avLst/>
+          </a:prstGeom>
+        </p:spPr>
+      </p:pic>
+      <p:pic>
+        <p:nvPicPr>
+          <p:cNvPr id="9" name="Slika 8">
+            <a:extLst>
+              <a:ext uri="{FF2B5EF4-FFF2-40B4-BE49-F238E27FC236}">
+                <a16:creationId xmlns:a16="http://schemas.microsoft.com/office/drawing/2014/main" id="{6CA5A871-ADCB-7B9C-7907-808BE0672282}"/>
+              </a:ext>
+            </a:extLst>
+          </p:cNvPr>
+          <p:cNvPicPr>
+            <a:picLocks noChangeAspect="1"/>
+          </p:cNvPicPr>
+          <p:nvPr/>
+        </p:nvPicPr>
+        <p:blipFill>
+          <a:blip r:embed="rId3">
+            <a:extLst>
+              <a:ext uri="{28A0092B-C50C-407E-A947-70E740481C1C}">
+                <a14:useLocalDpi xmlns:a14="http://schemas.microsoft.com/office/drawing/2010/main" val="0"/>
+              </a:ext>
+            </a:extLst>
+          </a:blip>
+          <a:stretch>
+            <a:fillRect/>
+          </a:stretch>
+        </p:blipFill>
+        <p:spPr>
+          <a:xfrm>
+            <a:off x="1515497" y="7176942"/>
+            <a:ext cx="3964165" cy="424732"/>
+          </a:xfrm>
+          <a:prstGeom prst="rect">
+            <a:avLst/>
+          </a:prstGeom>
+        </p:spPr>
+      </p:pic>
+      <p:pic>
+        <p:nvPicPr>
+          <p:cNvPr id="11" name="Slika 10" descr="Slika na kojoj se prikazuje dijagram, crta, radnja, snimka zaslona&#10;&#10;Opis je automatski generiran">
+            <a:extLst>
+              <a:ext uri="{FF2B5EF4-FFF2-40B4-BE49-F238E27FC236}">
+                <a16:creationId xmlns:a16="http://schemas.microsoft.com/office/drawing/2014/main" id="{863D28D5-9FBA-F908-1632-5350ACFC30F8}"/>
+              </a:ext>
+            </a:extLst>
+          </p:cNvPr>
+          <p:cNvPicPr>
+            <a:picLocks noChangeAspect="1"/>
+          </p:cNvPicPr>
+          <p:nvPr/>
+        </p:nvPicPr>
+        <p:blipFill>
+          <a:blip r:embed="rId4">
+            <a:extLst>
+              <a:ext uri="{28A0092B-C50C-407E-A947-70E740481C1C}">
+                <a14:useLocalDpi xmlns:a14="http://schemas.microsoft.com/office/drawing/2010/main" val="0"/>
+              </a:ext>
+            </a:extLst>
+          </a:blip>
+          <a:stretch>
+            <a:fillRect/>
+          </a:stretch>
+        </p:blipFill>
+        <p:spPr>
+          <a:xfrm>
+            <a:off x="8434755" y="3277896"/>
+            <a:ext cx="4991100" cy="3779520"/>
+          </a:xfrm>
+          <a:prstGeom prst="rect">
+            <a:avLst/>
+          </a:prstGeom>
+        </p:spPr>
+      </p:pic>
+      <p:pic>
+        <p:nvPicPr>
+          <p:cNvPr id="15" name="Slika 14" descr="Slika na kojoj se prikazuje tekst, Font, snimka zaslona&#10;&#10;Opis je automatski generiran">
+            <a:extLst>
+              <a:ext uri="{FF2B5EF4-FFF2-40B4-BE49-F238E27FC236}">
+                <a16:creationId xmlns:a16="http://schemas.microsoft.com/office/drawing/2014/main" id="{95A12523-6BA9-3337-A849-EF1FF34B7793}"/>
+              </a:ext>
+            </a:extLst>
+          </p:cNvPr>
+          <p:cNvPicPr>
+            <a:picLocks noChangeAspect="1"/>
+          </p:cNvPicPr>
+          <p:nvPr/>
+        </p:nvPicPr>
+        <p:blipFill>
+          <a:blip r:embed="rId5">
+            <a:extLst>
+              <a:ext uri="{28A0092B-C50C-407E-A947-70E740481C1C}">
+                <a14:useLocalDpi xmlns:a14="http://schemas.microsoft.com/office/drawing/2010/main" val="0"/>
+              </a:ext>
+            </a:extLst>
+          </a:blip>
+          <a:stretch>
+            <a:fillRect/>
+          </a:stretch>
+        </p:blipFill>
+        <p:spPr>
+          <a:xfrm>
+            <a:off x="9391333" y="7123522"/>
+            <a:ext cx="3549013" cy="733342"/>
+          </a:xfrm>
+          <a:prstGeom prst="rect">
+            <a:avLst/>
+          </a:prstGeom>
+        </p:spPr>
+      </p:pic>
+    </p:spTree>
+    <p:extLst>
+      <p:ext uri="{BB962C8B-B14F-4D97-AF65-F5344CB8AC3E}">
+        <p14:creationId xmlns:p14="http://schemas.microsoft.com/office/powerpoint/2010/main" val="394208363"/>
       </p:ext>
     </p:extLst>
   </p:cSld>
@@ -26948,18 +27122,18 @@
 </file>
 
 <file path=customXml/item2.xml><?xml version="1.0" encoding="utf-8"?>
+<p:properties xmlns:p="http://schemas.microsoft.com/office/2006/metadata/properties" xmlns:xsi="http://www.w3.org/2001/XMLSchema-instance" xmlns:pc="http://schemas.microsoft.com/office/infopath/2007/PartnerControls">
+  <documentManagement/>
+</p:properties>
+</file>
+
+<file path=customXml/item3.xml><?xml version="1.0" encoding="utf-8"?>
 <?mso-contentType ?>
 <FormTemplates xmlns="http://schemas.microsoft.com/sharepoint/v3/contenttype/forms">
   <Display>DocumentLibraryForm</Display>
   <Edit>DocumentLibraryForm</Edit>
   <New>DocumentLibraryForm</New>
 </FormTemplates>
-</file>
-
-<file path=customXml/item3.xml><?xml version="1.0" encoding="utf-8"?>
-<p:properties xmlns:p="http://schemas.microsoft.com/office/2006/metadata/properties" xmlns:xsi="http://www.w3.org/2001/XMLSchema-instance" xmlns:pc="http://schemas.microsoft.com/office/infopath/2007/PartnerControls">
-  <documentManagement/>
-</p:properties>
 </file>
 
 <file path=customXml/itemProps1.xml><?xml version="1.0" encoding="utf-8"?>
@@ -26983,14 +27157,6 @@
 </file>
 
 <file path=customXml/itemProps2.xml><?xml version="1.0" encoding="utf-8"?>
-<ds:datastoreItem xmlns:ds="http://schemas.openxmlformats.org/officeDocument/2006/customXml" ds:itemID="{0C2C9D2D-4966-4033-83BF-B86269848EDC}">
-  <ds:schemaRefs>
-    <ds:schemaRef ds:uri="http://schemas.microsoft.com/sharepoint/v3/contenttype/forms"/>
-  </ds:schemaRefs>
-</ds:datastoreItem>
-</file>
-
-<file path=customXml/itemProps3.xml><?xml version="1.0" encoding="utf-8"?>
 <ds:datastoreItem xmlns:ds="http://schemas.openxmlformats.org/officeDocument/2006/customXml" ds:itemID="{BFC5E9DD-0FB8-4161-BEDC-BC91609E3813}">
   <ds:schemaRefs>
     <ds:schemaRef ds:uri="http://schemas.microsoft.com/office/2006/metadata/properties"/>
@@ -26998,4 +27164,12 @@
     <ds:schemaRef ds:uri="http://schemas.microsoft.com/office/infopath/2007/PartnerControls"/>
   </ds:schemaRefs>
 </ds:datastoreItem>
+</file>
+
+<file path=customXml/itemProps3.xml><?xml version="1.0" encoding="utf-8"?>
+<ds:datastoreItem xmlns:ds="http://schemas.openxmlformats.org/officeDocument/2006/customXml" ds:itemID="{0C2C9D2D-4966-4033-83BF-B86269848EDC}">
+  <ds:schemaRefs>
+    <ds:schemaRef ds:uri="http://schemas.microsoft.com/sharepoint/v3/contenttype/forms"/>
+  </ds:schemaRefs>
+</ds:datastoreItem>
 </file>
</xml_diff>